<commit_message>
adds referential integrity topic
</commit_message>
<xml_diff>
--- a/Slides/Ders 7 Kısıtlamalar.pptx
+++ b/Slides/Ders 7 Kısıtlamalar.pptx
@@ -5,12 +5,15 @@
     <p:sldMasterId id="2147483660" r:id="rId1"/>
   </p:sldMasterIdLst>
   <p:notesMasterIdLst>
-    <p:notesMasterId r:id="rId5"/>
+    <p:notesMasterId r:id="rId8"/>
   </p:notesMasterIdLst>
   <p:sldIdLst>
     <p:sldId id="256" r:id="rId2"/>
     <p:sldId id="257" r:id="rId3"/>
     <p:sldId id="258" r:id="rId4"/>
+    <p:sldId id="259" r:id="rId5"/>
+    <p:sldId id="260" r:id="rId6"/>
+    <p:sldId id="261" r:id="rId7"/>
   </p:sldIdLst>
   <p:sldSz cx="9144000" cy="6858000" type="screen4x3"/>
   <p:notesSz cx="6858000" cy="9144000"/>
@@ -4432,6 +4435,3600 @@
     <p:extLst>
       <p:ext uri="{BB962C8B-B14F-4D97-AF65-F5344CB8AC3E}">
         <p14:creationId xmlns:p14="http://schemas.microsoft.com/office/powerpoint/2010/main" val="4082439516"/>
+      </p:ext>
+    </p:extLst>
+  </p:cSld>
+  <p:clrMapOvr>
+    <a:masterClrMapping/>
+  </p:clrMapOvr>
+</p:sld>
+</file>
+
+<file path=ppt/slides/slide4.xml><?xml version="1.0" encoding="utf-8"?>
+<p:sld xmlns:a="http://schemas.openxmlformats.org/drawingml/2006/main" xmlns:r="http://schemas.openxmlformats.org/officeDocument/2006/relationships" xmlns:p="http://schemas.openxmlformats.org/presentationml/2006/main">
+  <p:cSld>
+    <p:spTree>
+      <p:nvGrpSpPr>
+        <p:cNvPr id="1" name=""/>
+        <p:cNvGrpSpPr/>
+        <p:nvPr/>
+      </p:nvGrpSpPr>
+      <p:grpSpPr>
+        <a:xfrm>
+          <a:off x="0" y="0"/>
+          <a:ext cx="0" cy="0"/>
+          <a:chOff x="0" y="0"/>
+          <a:chExt cx="0" cy="0"/>
+        </a:xfrm>
+      </p:grpSpPr>
+      <p:sp>
+        <p:nvSpPr>
+          <p:cNvPr id="2" name="Title 1">
+            <a:extLst>
+              <a:ext uri="{FF2B5EF4-FFF2-40B4-BE49-F238E27FC236}">
+                <a16:creationId xmlns:a16="http://schemas.microsoft.com/office/drawing/2014/main" id="{D1B8C2F0-24BC-60BB-78E8-0CA1B08AE1E2}"/>
+              </a:ext>
+            </a:extLst>
+          </p:cNvPr>
+          <p:cNvSpPr>
+            <a:spLocks noGrp="1"/>
+          </p:cNvSpPr>
+          <p:nvPr>
+            <p:ph type="title"/>
+          </p:nvPr>
+        </p:nvSpPr>
+        <p:spPr/>
+        <p:txBody>
+          <a:bodyPr/>
+          <a:lstStyle/>
+          <a:p>
+            <a:r>
+              <a:rPr lang="tr-TR" dirty="0"/>
+              <a:t>Referans Bütünlüğü Kısıtlamaları</a:t>
+            </a:r>
+          </a:p>
+        </p:txBody>
+      </p:sp>
+      <p:graphicFrame>
+        <p:nvGraphicFramePr>
+          <p:cNvPr id="4" name="Table 4">
+            <a:extLst>
+              <a:ext uri="{FF2B5EF4-FFF2-40B4-BE49-F238E27FC236}">
+                <a16:creationId xmlns:a16="http://schemas.microsoft.com/office/drawing/2014/main" id="{10F33175-0A77-E573-D794-E0B87B54A8EA}"/>
+              </a:ext>
+            </a:extLst>
+          </p:cNvPr>
+          <p:cNvGraphicFramePr>
+            <a:graphicFrameLocks noGrp="1"/>
+          </p:cNvGraphicFramePr>
+          <p:nvPr>
+            <p:extLst>
+              <p:ext uri="{D42A27DB-BD31-4B8C-83A1-F6EECF244321}">
+                <p14:modId xmlns:p14="http://schemas.microsoft.com/office/powerpoint/2010/main" val="1167699488"/>
+              </p:ext>
+            </p:extLst>
+          </p:nvPr>
+        </p:nvGraphicFramePr>
+        <p:xfrm>
+          <a:off x="331850" y="4638674"/>
+          <a:ext cx="2460500" cy="1854200"/>
+        </p:xfrm>
+        <a:graphic>
+          <a:graphicData uri="http://schemas.openxmlformats.org/drawingml/2006/table">
+            <a:tbl>
+              <a:tblPr firstRow="1" bandRow="1">
+                <a:tableStyleId>{21E4AEA4-8DFA-4A89-87EB-49C32662AFE0}</a:tableStyleId>
+              </a:tblPr>
+              <a:tblGrid>
+                <a:gridCol w="849414">
+                  <a:extLst>
+                    <a:ext uri="{9D8B030D-6E8A-4147-A177-3AD203B41FA5}">
+                      <a16:colId xmlns:a16="http://schemas.microsoft.com/office/drawing/2014/main" val="2769281433"/>
+                    </a:ext>
+                  </a:extLst>
+                </a:gridCol>
+                <a:gridCol w="478972">
+                  <a:extLst>
+                    <a:ext uri="{9D8B030D-6E8A-4147-A177-3AD203B41FA5}">
+                      <a16:colId xmlns:a16="http://schemas.microsoft.com/office/drawing/2014/main" val="3951885846"/>
+                    </a:ext>
+                  </a:extLst>
+                </a:gridCol>
+                <a:gridCol w="516989">
+                  <a:extLst>
+                    <a:ext uri="{9D8B030D-6E8A-4147-A177-3AD203B41FA5}">
+                      <a16:colId xmlns:a16="http://schemas.microsoft.com/office/drawing/2014/main" val="3582607100"/>
+                    </a:ext>
+                  </a:extLst>
+                </a:gridCol>
+                <a:gridCol w="615125">
+                  <a:extLst>
+                    <a:ext uri="{9D8B030D-6E8A-4147-A177-3AD203B41FA5}">
+                      <a16:colId xmlns:a16="http://schemas.microsoft.com/office/drawing/2014/main" val="1001948809"/>
+                    </a:ext>
+                  </a:extLst>
+                </a:gridCol>
+              </a:tblGrid>
+              <a:tr h="370840">
+                <a:tc>
+                  <a:txBody>
+                    <a:bodyPr/>
+                    <a:lstStyle/>
+                    <a:p>
+                      <a:r>
+                        <a:rPr lang="tr-TR" dirty="0" err="1"/>
+                        <a:t>öğr_id</a:t>
+                      </a:r>
+                      <a:endParaRPr lang="tr-TR" dirty="0"/>
+                    </a:p>
+                  </a:txBody>
+                  <a:tcPr/>
+                </a:tc>
+                <a:tc>
+                  <a:txBody>
+                    <a:bodyPr/>
+                    <a:lstStyle/>
+                    <a:p>
+                      <a:r>
+                        <a:rPr lang="tr-TR" dirty="0"/>
+                        <a:t>ad</a:t>
+                      </a:r>
+                    </a:p>
+                  </a:txBody>
+                  <a:tcPr/>
+                </a:tc>
+                <a:tc>
+                  <a:txBody>
+                    <a:bodyPr/>
+                    <a:lstStyle/>
+                    <a:p>
+                      <a:r>
+                        <a:rPr lang="tr-TR" dirty="0" err="1"/>
+                        <a:t>ort</a:t>
+                      </a:r>
+                      <a:endParaRPr lang="tr-TR" dirty="0"/>
+                    </a:p>
+                  </a:txBody>
+                  <a:tcPr/>
+                </a:tc>
+                <a:tc>
+                  <a:txBody>
+                    <a:bodyPr/>
+                    <a:lstStyle/>
+                    <a:p>
+                      <a:r>
+                        <a:rPr lang="tr-TR" dirty="0"/>
+                        <a:t>lise</a:t>
+                      </a:r>
+                    </a:p>
+                  </a:txBody>
+                  <a:tcPr/>
+                </a:tc>
+                <a:extLst>
+                  <a:ext uri="{0D108BD9-81ED-4DB2-BD59-A6C34878D82A}">
+                    <a16:rowId xmlns:a16="http://schemas.microsoft.com/office/drawing/2014/main" val="3005422436"/>
+                  </a:ext>
+                </a:extLst>
+              </a:tr>
+              <a:tr h="370840">
+                <a:tc>
+                  <a:txBody>
+                    <a:bodyPr/>
+                    <a:lstStyle/>
+                    <a:p>
+                      <a:endParaRPr lang="tr-TR"/>
+                    </a:p>
+                  </a:txBody>
+                  <a:tcPr/>
+                </a:tc>
+                <a:tc>
+                  <a:txBody>
+                    <a:bodyPr/>
+                    <a:lstStyle/>
+                    <a:p>
+                      <a:endParaRPr lang="tr-TR"/>
+                    </a:p>
+                  </a:txBody>
+                  <a:tcPr/>
+                </a:tc>
+                <a:tc>
+                  <a:txBody>
+                    <a:bodyPr/>
+                    <a:lstStyle/>
+                    <a:p>
+                      <a:endParaRPr lang="tr-TR" dirty="0"/>
+                    </a:p>
+                  </a:txBody>
+                  <a:tcPr/>
+                </a:tc>
+                <a:tc>
+                  <a:txBody>
+                    <a:bodyPr/>
+                    <a:lstStyle/>
+                    <a:p>
+                      <a:endParaRPr lang="tr-TR"/>
+                    </a:p>
+                  </a:txBody>
+                  <a:tcPr/>
+                </a:tc>
+                <a:extLst>
+                  <a:ext uri="{0D108BD9-81ED-4DB2-BD59-A6C34878D82A}">
+                    <a16:rowId xmlns:a16="http://schemas.microsoft.com/office/drawing/2014/main" val="1621253080"/>
+                  </a:ext>
+                </a:extLst>
+              </a:tr>
+              <a:tr h="370840">
+                <a:tc>
+                  <a:txBody>
+                    <a:bodyPr/>
+                    <a:lstStyle/>
+                    <a:p>
+                      <a:endParaRPr lang="tr-TR"/>
+                    </a:p>
+                  </a:txBody>
+                  <a:tcPr/>
+                </a:tc>
+                <a:tc>
+                  <a:txBody>
+                    <a:bodyPr/>
+                    <a:lstStyle/>
+                    <a:p>
+                      <a:endParaRPr lang="tr-TR"/>
+                    </a:p>
+                  </a:txBody>
+                  <a:tcPr/>
+                </a:tc>
+                <a:tc>
+                  <a:txBody>
+                    <a:bodyPr/>
+                    <a:lstStyle/>
+                    <a:p>
+                      <a:endParaRPr lang="tr-TR"/>
+                    </a:p>
+                  </a:txBody>
+                  <a:tcPr/>
+                </a:tc>
+                <a:tc>
+                  <a:txBody>
+                    <a:bodyPr/>
+                    <a:lstStyle/>
+                    <a:p>
+                      <a:endParaRPr lang="tr-TR"/>
+                    </a:p>
+                  </a:txBody>
+                  <a:tcPr/>
+                </a:tc>
+                <a:extLst>
+                  <a:ext uri="{0D108BD9-81ED-4DB2-BD59-A6C34878D82A}">
+                    <a16:rowId xmlns:a16="http://schemas.microsoft.com/office/drawing/2014/main" val="579434912"/>
+                  </a:ext>
+                </a:extLst>
+              </a:tr>
+              <a:tr h="370840">
+                <a:tc>
+                  <a:txBody>
+                    <a:bodyPr/>
+                    <a:lstStyle/>
+                    <a:p>
+                      <a:endParaRPr lang="tr-TR"/>
+                    </a:p>
+                  </a:txBody>
+                  <a:tcPr/>
+                </a:tc>
+                <a:tc>
+                  <a:txBody>
+                    <a:bodyPr/>
+                    <a:lstStyle/>
+                    <a:p>
+                      <a:endParaRPr lang="tr-TR"/>
+                    </a:p>
+                  </a:txBody>
+                  <a:tcPr/>
+                </a:tc>
+                <a:tc>
+                  <a:txBody>
+                    <a:bodyPr/>
+                    <a:lstStyle/>
+                    <a:p>
+                      <a:endParaRPr lang="tr-TR"/>
+                    </a:p>
+                  </a:txBody>
+                  <a:tcPr/>
+                </a:tc>
+                <a:tc>
+                  <a:txBody>
+                    <a:bodyPr/>
+                    <a:lstStyle/>
+                    <a:p>
+                      <a:endParaRPr lang="tr-TR"/>
+                    </a:p>
+                  </a:txBody>
+                  <a:tcPr/>
+                </a:tc>
+                <a:extLst>
+                  <a:ext uri="{0D108BD9-81ED-4DB2-BD59-A6C34878D82A}">
+                    <a16:rowId xmlns:a16="http://schemas.microsoft.com/office/drawing/2014/main" val="2998448372"/>
+                  </a:ext>
+                </a:extLst>
+              </a:tr>
+              <a:tr h="370840">
+                <a:tc>
+                  <a:txBody>
+                    <a:bodyPr/>
+                    <a:lstStyle/>
+                    <a:p>
+                      <a:endParaRPr lang="tr-TR"/>
+                    </a:p>
+                  </a:txBody>
+                  <a:tcPr/>
+                </a:tc>
+                <a:tc>
+                  <a:txBody>
+                    <a:bodyPr/>
+                    <a:lstStyle/>
+                    <a:p>
+                      <a:endParaRPr lang="tr-TR"/>
+                    </a:p>
+                  </a:txBody>
+                  <a:tcPr/>
+                </a:tc>
+                <a:tc>
+                  <a:txBody>
+                    <a:bodyPr/>
+                    <a:lstStyle/>
+                    <a:p>
+                      <a:endParaRPr lang="tr-TR"/>
+                    </a:p>
+                  </a:txBody>
+                  <a:tcPr/>
+                </a:tc>
+                <a:tc>
+                  <a:txBody>
+                    <a:bodyPr/>
+                    <a:lstStyle/>
+                    <a:p>
+                      <a:endParaRPr lang="tr-TR" dirty="0"/>
+                    </a:p>
+                  </a:txBody>
+                  <a:tcPr/>
+                </a:tc>
+                <a:extLst>
+                  <a:ext uri="{0D108BD9-81ED-4DB2-BD59-A6C34878D82A}">
+                    <a16:rowId xmlns:a16="http://schemas.microsoft.com/office/drawing/2014/main" val="1885487499"/>
+                  </a:ext>
+                </a:extLst>
+              </a:tr>
+            </a:tbl>
+          </a:graphicData>
+        </a:graphic>
+      </p:graphicFrame>
+      <p:graphicFrame>
+        <p:nvGraphicFramePr>
+          <p:cNvPr id="6" name="Table 4">
+            <a:extLst>
+              <a:ext uri="{FF2B5EF4-FFF2-40B4-BE49-F238E27FC236}">
+                <a16:creationId xmlns:a16="http://schemas.microsoft.com/office/drawing/2014/main" id="{23D5DC5A-7E27-9D04-E77C-C5803DBB824D}"/>
+              </a:ext>
+            </a:extLst>
+          </p:cNvPr>
+          <p:cNvGraphicFramePr>
+            <a:graphicFrameLocks noGrp="1"/>
+          </p:cNvGraphicFramePr>
+          <p:nvPr>
+            <p:extLst>
+              <p:ext uri="{D42A27DB-BD31-4B8C-83A1-F6EECF244321}">
+                <p14:modId xmlns:p14="http://schemas.microsoft.com/office/powerpoint/2010/main" val="3783733801"/>
+              </p:ext>
+            </p:extLst>
+          </p:nvPr>
+        </p:nvGraphicFramePr>
+        <p:xfrm>
+          <a:off x="3162136" y="4638674"/>
+          <a:ext cx="2819728" cy="1854200"/>
+        </p:xfrm>
+        <a:graphic>
+          <a:graphicData uri="http://schemas.openxmlformats.org/drawingml/2006/table">
+            <a:tbl>
+              <a:tblPr firstRow="1" bandRow="1">
+                <a:tableStyleId>{5C22544A-7EE6-4342-B048-85BDC9FD1C3A}</a:tableStyleId>
+              </a:tblPr>
+              <a:tblGrid>
+                <a:gridCol w="816757">
+                  <a:extLst>
+                    <a:ext uri="{9D8B030D-6E8A-4147-A177-3AD203B41FA5}">
+                      <a16:colId xmlns:a16="http://schemas.microsoft.com/office/drawing/2014/main" val="2769281433"/>
+                    </a:ext>
+                  </a:extLst>
+                </a:gridCol>
+                <a:gridCol w="674914">
+                  <a:extLst>
+                    <a:ext uri="{9D8B030D-6E8A-4147-A177-3AD203B41FA5}">
+                      <a16:colId xmlns:a16="http://schemas.microsoft.com/office/drawing/2014/main" val="3951885846"/>
+                    </a:ext>
+                  </a:extLst>
+                </a:gridCol>
+                <a:gridCol w="623125">
+                  <a:extLst>
+                    <a:ext uri="{9D8B030D-6E8A-4147-A177-3AD203B41FA5}">
+                      <a16:colId xmlns:a16="http://schemas.microsoft.com/office/drawing/2014/main" val="3582607100"/>
+                    </a:ext>
+                  </a:extLst>
+                </a:gridCol>
+                <a:gridCol w="704932">
+                  <a:extLst>
+                    <a:ext uri="{9D8B030D-6E8A-4147-A177-3AD203B41FA5}">
+                      <a16:colId xmlns:a16="http://schemas.microsoft.com/office/drawing/2014/main" val="1001948809"/>
+                    </a:ext>
+                  </a:extLst>
+                </a:gridCol>
+              </a:tblGrid>
+              <a:tr h="370840">
+                <a:tc>
+                  <a:txBody>
+                    <a:bodyPr/>
+                    <a:lstStyle/>
+                    <a:p>
+                      <a:r>
+                        <a:rPr lang="tr-TR" dirty="0" err="1"/>
+                        <a:t>öğr_id</a:t>
+                      </a:r>
+                      <a:endParaRPr lang="tr-TR" dirty="0"/>
+                    </a:p>
+                  </a:txBody>
+                  <a:tcPr/>
+                </a:tc>
+                <a:tc>
+                  <a:txBody>
+                    <a:bodyPr/>
+                    <a:lstStyle/>
+                    <a:p>
+                      <a:r>
+                        <a:rPr lang="tr-TR" dirty="0"/>
+                        <a:t>okul</a:t>
+                      </a:r>
+                    </a:p>
+                  </a:txBody>
+                  <a:tcPr/>
+                </a:tc>
+                <a:tc>
+                  <a:txBody>
+                    <a:bodyPr/>
+                    <a:lstStyle/>
+                    <a:p>
+                      <a:r>
+                        <a:rPr lang="tr-TR" dirty="0" err="1"/>
+                        <a:t>a.d</a:t>
+                      </a:r>
+                      <a:r>
+                        <a:rPr lang="tr-TR" dirty="0"/>
+                        <a:t>.</a:t>
+                      </a:r>
+                    </a:p>
+                  </a:txBody>
+                  <a:tcPr/>
+                </a:tc>
+                <a:tc>
+                  <a:txBody>
+                    <a:bodyPr/>
+                    <a:lstStyle/>
+                    <a:p>
+                      <a:r>
+                        <a:rPr lang="tr-TR" dirty="0"/>
+                        <a:t>karar</a:t>
+                      </a:r>
+                    </a:p>
+                  </a:txBody>
+                  <a:tcPr/>
+                </a:tc>
+                <a:extLst>
+                  <a:ext uri="{0D108BD9-81ED-4DB2-BD59-A6C34878D82A}">
+                    <a16:rowId xmlns:a16="http://schemas.microsoft.com/office/drawing/2014/main" val="3005422436"/>
+                  </a:ext>
+                </a:extLst>
+              </a:tr>
+              <a:tr h="370840">
+                <a:tc>
+                  <a:txBody>
+                    <a:bodyPr/>
+                    <a:lstStyle/>
+                    <a:p>
+                      <a:endParaRPr lang="tr-TR"/>
+                    </a:p>
+                  </a:txBody>
+                  <a:tcPr/>
+                </a:tc>
+                <a:tc>
+                  <a:txBody>
+                    <a:bodyPr/>
+                    <a:lstStyle/>
+                    <a:p>
+                      <a:endParaRPr lang="tr-TR"/>
+                    </a:p>
+                  </a:txBody>
+                  <a:tcPr/>
+                </a:tc>
+                <a:tc>
+                  <a:txBody>
+                    <a:bodyPr/>
+                    <a:lstStyle/>
+                    <a:p>
+                      <a:endParaRPr lang="tr-TR" dirty="0"/>
+                    </a:p>
+                  </a:txBody>
+                  <a:tcPr/>
+                </a:tc>
+                <a:tc>
+                  <a:txBody>
+                    <a:bodyPr/>
+                    <a:lstStyle/>
+                    <a:p>
+                      <a:endParaRPr lang="tr-TR"/>
+                    </a:p>
+                  </a:txBody>
+                  <a:tcPr/>
+                </a:tc>
+                <a:extLst>
+                  <a:ext uri="{0D108BD9-81ED-4DB2-BD59-A6C34878D82A}">
+                    <a16:rowId xmlns:a16="http://schemas.microsoft.com/office/drawing/2014/main" val="1621253080"/>
+                  </a:ext>
+                </a:extLst>
+              </a:tr>
+              <a:tr h="370840">
+                <a:tc>
+                  <a:txBody>
+                    <a:bodyPr/>
+                    <a:lstStyle/>
+                    <a:p>
+                      <a:endParaRPr lang="tr-TR" dirty="0"/>
+                    </a:p>
+                  </a:txBody>
+                  <a:tcPr/>
+                </a:tc>
+                <a:tc>
+                  <a:txBody>
+                    <a:bodyPr/>
+                    <a:lstStyle/>
+                    <a:p>
+                      <a:endParaRPr lang="tr-TR"/>
+                    </a:p>
+                  </a:txBody>
+                  <a:tcPr/>
+                </a:tc>
+                <a:tc>
+                  <a:txBody>
+                    <a:bodyPr/>
+                    <a:lstStyle/>
+                    <a:p>
+                      <a:endParaRPr lang="tr-TR" dirty="0"/>
+                    </a:p>
+                  </a:txBody>
+                  <a:tcPr/>
+                </a:tc>
+                <a:tc>
+                  <a:txBody>
+                    <a:bodyPr/>
+                    <a:lstStyle/>
+                    <a:p>
+                      <a:endParaRPr lang="tr-TR"/>
+                    </a:p>
+                  </a:txBody>
+                  <a:tcPr/>
+                </a:tc>
+                <a:extLst>
+                  <a:ext uri="{0D108BD9-81ED-4DB2-BD59-A6C34878D82A}">
+                    <a16:rowId xmlns:a16="http://schemas.microsoft.com/office/drawing/2014/main" val="579434912"/>
+                  </a:ext>
+                </a:extLst>
+              </a:tr>
+              <a:tr h="370840">
+                <a:tc>
+                  <a:txBody>
+                    <a:bodyPr/>
+                    <a:lstStyle/>
+                    <a:p>
+                      <a:endParaRPr lang="tr-TR"/>
+                    </a:p>
+                  </a:txBody>
+                  <a:tcPr/>
+                </a:tc>
+                <a:tc>
+                  <a:txBody>
+                    <a:bodyPr/>
+                    <a:lstStyle/>
+                    <a:p>
+                      <a:endParaRPr lang="tr-TR"/>
+                    </a:p>
+                  </a:txBody>
+                  <a:tcPr/>
+                </a:tc>
+                <a:tc>
+                  <a:txBody>
+                    <a:bodyPr/>
+                    <a:lstStyle/>
+                    <a:p>
+                      <a:endParaRPr lang="tr-TR"/>
+                    </a:p>
+                  </a:txBody>
+                  <a:tcPr/>
+                </a:tc>
+                <a:tc>
+                  <a:txBody>
+                    <a:bodyPr/>
+                    <a:lstStyle/>
+                    <a:p>
+                      <a:endParaRPr lang="tr-TR"/>
+                    </a:p>
+                  </a:txBody>
+                  <a:tcPr/>
+                </a:tc>
+                <a:extLst>
+                  <a:ext uri="{0D108BD9-81ED-4DB2-BD59-A6C34878D82A}">
+                    <a16:rowId xmlns:a16="http://schemas.microsoft.com/office/drawing/2014/main" val="2998448372"/>
+                  </a:ext>
+                </a:extLst>
+              </a:tr>
+              <a:tr h="370840">
+                <a:tc>
+                  <a:txBody>
+                    <a:bodyPr/>
+                    <a:lstStyle/>
+                    <a:p>
+                      <a:endParaRPr lang="tr-TR"/>
+                    </a:p>
+                  </a:txBody>
+                  <a:tcPr/>
+                </a:tc>
+                <a:tc>
+                  <a:txBody>
+                    <a:bodyPr/>
+                    <a:lstStyle/>
+                    <a:p>
+                      <a:endParaRPr lang="tr-TR"/>
+                    </a:p>
+                  </a:txBody>
+                  <a:tcPr/>
+                </a:tc>
+                <a:tc>
+                  <a:txBody>
+                    <a:bodyPr/>
+                    <a:lstStyle/>
+                    <a:p>
+                      <a:endParaRPr lang="tr-TR"/>
+                    </a:p>
+                  </a:txBody>
+                  <a:tcPr/>
+                </a:tc>
+                <a:tc>
+                  <a:txBody>
+                    <a:bodyPr/>
+                    <a:lstStyle/>
+                    <a:p>
+                      <a:endParaRPr lang="tr-TR" dirty="0"/>
+                    </a:p>
+                  </a:txBody>
+                  <a:tcPr/>
+                </a:tc>
+                <a:extLst>
+                  <a:ext uri="{0D108BD9-81ED-4DB2-BD59-A6C34878D82A}">
+                    <a16:rowId xmlns:a16="http://schemas.microsoft.com/office/drawing/2014/main" val="1885487499"/>
+                  </a:ext>
+                </a:extLst>
+              </a:tr>
+            </a:tbl>
+          </a:graphicData>
+        </a:graphic>
+      </p:graphicFrame>
+      <p:graphicFrame>
+        <p:nvGraphicFramePr>
+          <p:cNvPr id="7" name="Table 4">
+            <a:extLst>
+              <a:ext uri="{FF2B5EF4-FFF2-40B4-BE49-F238E27FC236}">
+                <a16:creationId xmlns:a16="http://schemas.microsoft.com/office/drawing/2014/main" id="{795D4326-4DC2-732B-F04D-8CCBE6219E69}"/>
+              </a:ext>
+            </a:extLst>
+          </p:cNvPr>
+          <p:cNvGraphicFramePr>
+            <a:graphicFrameLocks noGrp="1"/>
+          </p:cNvGraphicFramePr>
+          <p:nvPr>
+            <p:extLst>
+              <p:ext uri="{D42A27DB-BD31-4B8C-83A1-F6EECF244321}">
+                <p14:modId xmlns:p14="http://schemas.microsoft.com/office/powerpoint/2010/main" val="2280526882"/>
+              </p:ext>
+            </p:extLst>
+          </p:nvPr>
+        </p:nvGraphicFramePr>
+        <p:xfrm>
+          <a:off x="6264563" y="4638674"/>
+          <a:ext cx="2343479" cy="1854200"/>
+        </p:xfrm>
+        <a:graphic>
+          <a:graphicData uri="http://schemas.openxmlformats.org/drawingml/2006/table">
+            <a:tbl>
+              <a:tblPr firstRow="1" bandRow="1">
+                <a:tableStyleId>{93296810-A885-4BE3-A3E7-6D5BEEA58F35}</a:tableStyleId>
+              </a:tblPr>
+              <a:tblGrid>
+                <a:gridCol w="905077">
+                  <a:extLst>
+                    <a:ext uri="{9D8B030D-6E8A-4147-A177-3AD203B41FA5}">
+                      <a16:colId xmlns:a16="http://schemas.microsoft.com/office/drawing/2014/main" val="2769281433"/>
+                    </a:ext>
+                  </a:extLst>
+                </a:gridCol>
+                <a:gridCol w="747896">
+                  <a:extLst>
+                    <a:ext uri="{9D8B030D-6E8A-4147-A177-3AD203B41FA5}">
+                      <a16:colId xmlns:a16="http://schemas.microsoft.com/office/drawing/2014/main" val="3951885846"/>
+                    </a:ext>
+                  </a:extLst>
+                </a:gridCol>
+                <a:gridCol w="690506">
+                  <a:extLst>
+                    <a:ext uri="{9D8B030D-6E8A-4147-A177-3AD203B41FA5}">
+                      <a16:colId xmlns:a16="http://schemas.microsoft.com/office/drawing/2014/main" val="3582607100"/>
+                    </a:ext>
+                  </a:extLst>
+                </a:gridCol>
+              </a:tblGrid>
+              <a:tr h="370840">
+                <a:tc>
+                  <a:txBody>
+                    <a:bodyPr/>
+                    <a:lstStyle/>
+                    <a:p>
+                      <a:r>
+                        <a:rPr lang="tr-TR" dirty="0"/>
+                        <a:t>okul</a:t>
+                      </a:r>
+                    </a:p>
+                  </a:txBody>
+                  <a:tcPr/>
+                </a:tc>
+                <a:tc>
+                  <a:txBody>
+                    <a:bodyPr/>
+                    <a:lstStyle/>
+                    <a:p>
+                      <a:r>
+                        <a:rPr lang="tr-TR" dirty="0"/>
+                        <a:t>şehir</a:t>
+                      </a:r>
+                    </a:p>
+                  </a:txBody>
+                  <a:tcPr/>
+                </a:tc>
+                <a:tc>
+                  <a:txBody>
+                    <a:bodyPr/>
+                    <a:lstStyle/>
+                    <a:p>
+                      <a:r>
+                        <a:rPr lang="tr-TR" dirty="0" err="1"/>
+                        <a:t>mev</a:t>
+                      </a:r>
+                      <a:r>
+                        <a:rPr lang="tr-TR" dirty="0"/>
+                        <a:t>.</a:t>
+                      </a:r>
+                    </a:p>
+                  </a:txBody>
+                  <a:tcPr/>
+                </a:tc>
+                <a:extLst>
+                  <a:ext uri="{0D108BD9-81ED-4DB2-BD59-A6C34878D82A}">
+                    <a16:rowId xmlns:a16="http://schemas.microsoft.com/office/drawing/2014/main" val="3005422436"/>
+                  </a:ext>
+                </a:extLst>
+              </a:tr>
+              <a:tr h="370840">
+                <a:tc>
+                  <a:txBody>
+                    <a:bodyPr/>
+                    <a:lstStyle/>
+                    <a:p>
+                      <a:endParaRPr lang="tr-TR"/>
+                    </a:p>
+                  </a:txBody>
+                  <a:tcPr/>
+                </a:tc>
+                <a:tc>
+                  <a:txBody>
+                    <a:bodyPr/>
+                    <a:lstStyle/>
+                    <a:p>
+                      <a:endParaRPr lang="tr-TR"/>
+                    </a:p>
+                  </a:txBody>
+                  <a:tcPr/>
+                </a:tc>
+                <a:tc>
+                  <a:txBody>
+                    <a:bodyPr/>
+                    <a:lstStyle/>
+                    <a:p>
+                      <a:endParaRPr lang="tr-TR" dirty="0"/>
+                    </a:p>
+                  </a:txBody>
+                  <a:tcPr/>
+                </a:tc>
+                <a:extLst>
+                  <a:ext uri="{0D108BD9-81ED-4DB2-BD59-A6C34878D82A}">
+                    <a16:rowId xmlns:a16="http://schemas.microsoft.com/office/drawing/2014/main" val="1621253080"/>
+                  </a:ext>
+                </a:extLst>
+              </a:tr>
+              <a:tr h="370840">
+                <a:tc>
+                  <a:txBody>
+                    <a:bodyPr/>
+                    <a:lstStyle/>
+                    <a:p>
+                      <a:endParaRPr lang="tr-TR" dirty="0"/>
+                    </a:p>
+                  </a:txBody>
+                  <a:tcPr/>
+                </a:tc>
+                <a:tc>
+                  <a:txBody>
+                    <a:bodyPr/>
+                    <a:lstStyle/>
+                    <a:p>
+                      <a:endParaRPr lang="tr-TR"/>
+                    </a:p>
+                  </a:txBody>
+                  <a:tcPr/>
+                </a:tc>
+                <a:tc>
+                  <a:txBody>
+                    <a:bodyPr/>
+                    <a:lstStyle/>
+                    <a:p>
+                      <a:endParaRPr lang="tr-TR" dirty="0"/>
+                    </a:p>
+                  </a:txBody>
+                  <a:tcPr/>
+                </a:tc>
+                <a:extLst>
+                  <a:ext uri="{0D108BD9-81ED-4DB2-BD59-A6C34878D82A}">
+                    <a16:rowId xmlns:a16="http://schemas.microsoft.com/office/drawing/2014/main" val="579434912"/>
+                  </a:ext>
+                </a:extLst>
+              </a:tr>
+              <a:tr h="370840">
+                <a:tc>
+                  <a:txBody>
+                    <a:bodyPr/>
+                    <a:lstStyle/>
+                    <a:p>
+                      <a:endParaRPr lang="tr-TR"/>
+                    </a:p>
+                  </a:txBody>
+                  <a:tcPr/>
+                </a:tc>
+                <a:tc>
+                  <a:txBody>
+                    <a:bodyPr/>
+                    <a:lstStyle/>
+                    <a:p>
+                      <a:endParaRPr lang="tr-TR"/>
+                    </a:p>
+                  </a:txBody>
+                  <a:tcPr/>
+                </a:tc>
+                <a:tc>
+                  <a:txBody>
+                    <a:bodyPr/>
+                    <a:lstStyle/>
+                    <a:p>
+                      <a:endParaRPr lang="tr-TR"/>
+                    </a:p>
+                  </a:txBody>
+                  <a:tcPr/>
+                </a:tc>
+                <a:extLst>
+                  <a:ext uri="{0D108BD9-81ED-4DB2-BD59-A6C34878D82A}">
+                    <a16:rowId xmlns:a16="http://schemas.microsoft.com/office/drawing/2014/main" val="2998448372"/>
+                  </a:ext>
+                </a:extLst>
+              </a:tr>
+              <a:tr h="370840">
+                <a:tc>
+                  <a:txBody>
+                    <a:bodyPr/>
+                    <a:lstStyle/>
+                    <a:p>
+                      <a:endParaRPr lang="tr-TR"/>
+                    </a:p>
+                  </a:txBody>
+                  <a:tcPr/>
+                </a:tc>
+                <a:tc>
+                  <a:txBody>
+                    <a:bodyPr/>
+                    <a:lstStyle/>
+                    <a:p>
+                      <a:endParaRPr lang="tr-TR"/>
+                    </a:p>
+                  </a:txBody>
+                  <a:tcPr/>
+                </a:tc>
+                <a:tc>
+                  <a:txBody>
+                    <a:bodyPr/>
+                    <a:lstStyle/>
+                    <a:p>
+                      <a:endParaRPr lang="tr-TR" dirty="0"/>
+                    </a:p>
+                  </a:txBody>
+                  <a:tcPr/>
+                </a:tc>
+                <a:extLst>
+                  <a:ext uri="{0D108BD9-81ED-4DB2-BD59-A6C34878D82A}">
+                    <a16:rowId xmlns:a16="http://schemas.microsoft.com/office/drawing/2014/main" val="1885487499"/>
+                  </a:ext>
+                </a:extLst>
+              </a:tr>
+            </a:tbl>
+          </a:graphicData>
+        </a:graphic>
+      </p:graphicFrame>
+      <p:sp>
+        <p:nvSpPr>
+          <p:cNvPr id="8" name="TextBox 7">
+            <a:extLst>
+              <a:ext uri="{FF2B5EF4-FFF2-40B4-BE49-F238E27FC236}">
+                <a16:creationId xmlns:a16="http://schemas.microsoft.com/office/drawing/2014/main" id="{EF17E23C-015F-3E0B-6221-5DA04096F1B3}"/>
+              </a:ext>
+            </a:extLst>
+          </p:cNvPr>
+          <p:cNvSpPr txBox="1"/>
+          <p:nvPr/>
+        </p:nvSpPr>
+        <p:spPr>
+          <a:xfrm>
+            <a:off x="997586" y="4269342"/>
+            <a:ext cx="1129027" cy="369332"/>
+          </a:xfrm>
+          <a:prstGeom prst="rect">
+            <a:avLst/>
+          </a:prstGeom>
+          <a:noFill/>
+        </p:spPr>
+        <p:txBody>
+          <a:bodyPr wrap="none" rtlCol="0">
+            <a:spAutoFit/>
+          </a:bodyPr>
+          <a:lstStyle/>
+          <a:p>
+            <a:r>
+              <a:rPr lang="tr-TR" dirty="0"/>
+              <a:t>öğrenciler</a:t>
+            </a:r>
+          </a:p>
+        </p:txBody>
+      </p:sp>
+      <p:sp>
+        <p:nvSpPr>
+          <p:cNvPr id="9" name="TextBox 8">
+            <a:extLst>
+              <a:ext uri="{FF2B5EF4-FFF2-40B4-BE49-F238E27FC236}">
+                <a16:creationId xmlns:a16="http://schemas.microsoft.com/office/drawing/2014/main" id="{582E250B-0C4A-5435-E1B2-E9A285F65BFC}"/>
+              </a:ext>
+            </a:extLst>
+          </p:cNvPr>
+          <p:cNvSpPr txBox="1"/>
+          <p:nvPr/>
+        </p:nvSpPr>
+        <p:spPr>
+          <a:xfrm>
+            <a:off x="3984467" y="4269342"/>
+            <a:ext cx="1175065" cy="369332"/>
+          </a:xfrm>
+          <a:prstGeom prst="rect">
+            <a:avLst/>
+          </a:prstGeom>
+          <a:noFill/>
+        </p:spPr>
+        <p:txBody>
+          <a:bodyPr wrap="none" rtlCol="0">
+            <a:spAutoFit/>
+          </a:bodyPr>
+          <a:lstStyle/>
+          <a:p>
+            <a:r>
+              <a:rPr lang="tr-TR" dirty="0"/>
+              <a:t>başvurular</a:t>
+            </a:r>
+          </a:p>
+        </p:txBody>
+      </p:sp>
+      <p:sp>
+        <p:nvSpPr>
+          <p:cNvPr id="10" name="TextBox 9">
+            <a:extLst>
+              <a:ext uri="{FF2B5EF4-FFF2-40B4-BE49-F238E27FC236}">
+                <a16:creationId xmlns:a16="http://schemas.microsoft.com/office/drawing/2014/main" id="{4F17AB32-38DE-7001-563A-C344D5123D3B}"/>
+              </a:ext>
+            </a:extLst>
+          </p:cNvPr>
+          <p:cNvSpPr txBox="1"/>
+          <p:nvPr/>
+        </p:nvSpPr>
+        <p:spPr>
+          <a:xfrm>
+            <a:off x="6758424" y="4269342"/>
+            <a:ext cx="1355756" cy="369332"/>
+          </a:xfrm>
+          <a:prstGeom prst="rect">
+            <a:avLst/>
+          </a:prstGeom>
+          <a:noFill/>
+        </p:spPr>
+        <p:txBody>
+          <a:bodyPr wrap="none" rtlCol="0">
+            <a:spAutoFit/>
+          </a:bodyPr>
+          <a:lstStyle/>
+          <a:p>
+            <a:r>
+              <a:rPr lang="tr-TR" dirty="0"/>
+              <a:t>üniversiteler</a:t>
+            </a:r>
+          </a:p>
+        </p:txBody>
+      </p:sp>
+      <p:sp>
+        <p:nvSpPr>
+          <p:cNvPr id="11" name="TextBox 10">
+            <a:extLst>
+              <a:ext uri="{FF2B5EF4-FFF2-40B4-BE49-F238E27FC236}">
+                <a16:creationId xmlns:a16="http://schemas.microsoft.com/office/drawing/2014/main" id="{C40D7FBF-7E62-769B-B087-FCE7BC406C97}"/>
+              </a:ext>
+            </a:extLst>
+          </p:cNvPr>
+          <p:cNvSpPr txBox="1"/>
+          <p:nvPr/>
+        </p:nvSpPr>
+        <p:spPr>
+          <a:xfrm>
+            <a:off x="628650" y="1690689"/>
+            <a:ext cx="7979392" cy="2031325"/>
+          </a:xfrm>
+          <a:prstGeom prst="rect">
+            <a:avLst/>
+          </a:prstGeom>
+          <a:noFill/>
+        </p:spPr>
+        <p:txBody>
+          <a:bodyPr wrap="square" rtlCol="0">
+            <a:spAutoFit/>
+          </a:bodyPr>
+          <a:lstStyle/>
+          <a:p>
+            <a:pPr marL="285750" indent="-285750">
+              <a:buFont typeface="Arial" panose="020B0604020202020204" pitchFamily="34" charset="0"/>
+              <a:buChar char="•"/>
+            </a:pPr>
+            <a:r>
+              <a:rPr lang="tr-TR" i="1" dirty="0" err="1"/>
+              <a:t>R.A</a:t>
+            </a:r>
+            <a:r>
+              <a:rPr lang="tr-TR" dirty="0" err="1"/>
+              <a:t>'dan</a:t>
+            </a:r>
+            <a:r>
+              <a:rPr lang="tr-TR" dirty="0"/>
+              <a:t> </a:t>
+            </a:r>
+            <a:r>
+              <a:rPr lang="tr-TR" i="1" dirty="0" err="1"/>
+              <a:t>S.B</a:t>
+            </a:r>
+            <a:r>
+              <a:rPr lang="tr-TR" dirty="0" err="1"/>
+              <a:t>'ye</a:t>
+            </a:r>
+            <a:r>
+              <a:rPr lang="tr-TR" dirty="0"/>
+              <a:t> bir referans bütünlüğü sağlanması için </a:t>
+            </a:r>
+            <a:r>
+              <a:rPr lang="tr-TR" i="1" dirty="0"/>
+              <a:t>R</a:t>
+            </a:r>
+            <a:r>
+              <a:rPr lang="tr-TR" dirty="0"/>
+              <a:t> tablosundaki </a:t>
+            </a:r>
+            <a:r>
+              <a:rPr lang="tr-TR" i="1" dirty="0"/>
+              <a:t>A</a:t>
+            </a:r>
+            <a:r>
+              <a:rPr lang="tr-TR" dirty="0"/>
+              <a:t> sütununda bulunan tüm kayıtların </a:t>
+            </a:r>
+            <a:r>
+              <a:rPr lang="tr-TR" i="1" dirty="0"/>
+              <a:t>S</a:t>
+            </a:r>
+            <a:r>
+              <a:rPr lang="tr-TR" dirty="0"/>
+              <a:t> tablosundaki </a:t>
+            </a:r>
+            <a:r>
+              <a:rPr lang="tr-TR" i="1" dirty="0"/>
+              <a:t>B</a:t>
+            </a:r>
+            <a:r>
+              <a:rPr lang="tr-TR" dirty="0"/>
+              <a:t> sütununda bulunması gerekir.</a:t>
+            </a:r>
+          </a:p>
+          <a:p>
+            <a:pPr marL="285750" indent="-285750">
+              <a:buFont typeface="Arial" panose="020B0604020202020204" pitchFamily="34" charset="0"/>
+              <a:buChar char="•"/>
+            </a:pPr>
+            <a:r>
+              <a:rPr lang="tr-TR" i="1" dirty="0"/>
+              <a:t>A</a:t>
+            </a:r>
+            <a:r>
+              <a:rPr lang="tr-TR" dirty="0"/>
+              <a:t> niteliği yabancı anahtar (</a:t>
+            </a:r>
+            <a:r>
+              <a:rPr lang="tr-TR" i="1" dirty="0" err="1"/>
+              <a:t>foreign</a:t>
+            </a:r>
+            <a:r>
+              <a:rPr lang="tr-TR" i="1" dirty="0"/>
+              <a:t> </a:t>
+            </a:r>
+            <a:r>
+              <a:rPr lang="tr-TR" i="1" dirty="0" err="1"/>
+              <a:t>key</a:t>
+            </a:r>
+            <a:r>
+              <a:rPr lang="tr-TR" dirty="0"/>
+              <a:t>) olarak adlandırılır.</a:t>
+            </a:r>
+          </a:p>
+          <a:p>
+            <a:pPr marL="285750" indent="-285750">
+              <a:buFont typeface="Arial" panose="020B0604020202020204" pitchFamily="34" charset="0"/>
+              <a:buChar char="•"/>
+            </a:pPr>
+            <a:r>
+              <a:rPr lang="tr-TR" dirty="0"/>
+              <a:t>Referans bütünlüğü yönlüdür.</a:t>
+            </a:r>
+          </a:p>
+          <a:p>
+            <a:pPr marL="285750" indent="-285750">
+              <a:buFont typeface="Arial" panose="020B0604020202020204" pitchFamily="34" charset="0"/>
+              <a:buChar char="•"/>
+            </a:pPr>
+            <a:r>
+              <a:rPr lang="tr-TR" i="1" dirty="0"/>
+              <a:t>B</a:t>
+            </a:r>
+            <a:r>
+              <a:rPr lang="tr-TR" dirty="0"/>
+              <a:t>'nin </a:t>
+            </a:r>
+            <a:r>
+              <a:rPr lang="tr-TR" i="1" dirty="0" err="1"/>
+              <a:t>primary</a:t>
+            </a:r>
+            <a:r>
+              <a:rPr lang="tr-TR" i="1" dirty="0"/>
+              <a:t> </a:t>
+            </a:r>
+            <a:r>
+              <a:rPr lang="tr-TR" i="1" dirty="0" err="1"/>
+              <a:t>key</a:t>
+            </a:r>
+            <a:r>
+              <a:rPr lang="tr-TR" i="1" dirty="0"/>
+              <a:t> </a:t>
+            </a:r>
+            <a:r>
+              <a:rPr lang="tr-TR" dirty="0"/>
+              <a:t>veya </a:t>
+            </a:r>
+            <a:r>
+              <a:rPr lang="tr-TR" i="1" dirty="0" err="1"/>
+              <a:t>unique</a:t>
+            </a:r>
+            <a:r>
+              <a:rPr lang="tr-TR" dirty="0"/>
+              <a:t> olması gerekir.</a:t>
+            </a:r>
+          </a:p>
+          <a:p>
+            <a:pPr marL="285750" indent="-285750">
+              <a:buFont typeface="Arial" panose="020B0604020202020204" pitchFamily="34" charset="0"/>
+              <a:buChar char="•"/>
+            </a:pPr>
+            <a:endParaRPr lang="tr-TR" dirty="0"/>
+          </a:p>
+        </p:txBody>
+      </p:sp>
+    </p:spTree>
+    <p:extLst>
+      <p:ext uri="{BB962C8B-B14F-4D97-AF65-F5344CB8AC3E}">
+        <p14:creationId xmlns:p14="http://schemas.microsoft.com/office/powerpoint/2010/main" val="1414665868"/>
+      </p:ext>
+    </p:extLst>
+  </p:cSld>
+  <p:clrMapOvr>
+    <a:masterClrMapping/>
+  </p:clrMapOvr>
+</p:sld>
+</file>
+
+<file path=ppt/slides/slide5.xml><?xml version="1.0" encoding="utf-8"?>
+<p:sld xmlns:a="http://schemas.openxmlformats.org/drawingml/2006/main" xmlns:r="http://schemas.openxmlformats.org/officeDocument/2006/relationships" xmlns:p="http://schemas.openxmlformats.org/presentationml/2006/main">
+  <p:cSld>
+    <p:spTree>
+      <p:nvGrpSpPr>
+        <p:cNvPr id="1" name=""/>
+        <p:cNvGrpSpPr/>
+        <p:nvPr/>
+      </p:nvGrpSpPr>
+      <p:grpSpPr>
+        <a:xfrm>
+          <a:off x="0" y="0"/>
+          <a:ext cx="0" cy="0"/>
+          <a:chOff x="0" y="0"/>
+          <a:chExt cx="0" cy="0"/>
+        </a:xfrm>
+      </p:grpSpPr>
+      <p:sp>
+        <p:nvSpPr>
+          <p:cNvPr id="2" name="Title 1">
+            <a:extLst>
+              <a:ext uri="{FF2B5EF4-FFF2-40B4-BE49-F238E27FC236}">
+                <a16:creationId xmlns:a16="http://schemas.microsoft.com/office/drawing/2014/main" id="{D1B8C2F0-24BC-60BB-78E8-0CA1B08AE1E2}"/>
+              </a:ext>
+            </a:extLst>
+          </p:cNvPr>
+          <p:cNvSpPr>
+            <a:spLocks noGrp="1"/>
+          </p:cNvSpPr>
+          <p:nvPr>
+            <p:ph type="title"/>
+          </p:nvPr>
+        </p:nvSpPr>
+        <p:spPr/>
+        <p:txBody>
+          <a:bodyPr/>
+          <a:lstStyle/>
+          <a:p>
+            <a:r>
+              <a:rPr lang="tr-TR" dirty="0"/>
+              <a:t>Referans Bütünlüğü Kısıtlamaları</a:t>
+            </a:r>
+          </a:p>
+        </p:txBody>
+      </p:sp>
+      <p:graphicFrame>
+        <p:nvGraphicFramePr>
+          <p:cNvPr id="4" name="Table 4">
+            <a:extLst>
+              <a:ext uri="{FF2B5EF4-FFF2-40B4-BE49-F238E27FC236}">
+                <a16:creationId xmlns:a16="http://schemas.microsoft.com/office/drawing/2014/main" id="{10F33175-0A77-E573-D794-E0B87B54A8EA}"/>
+              </a:ext>
+            </a:extLst>
+          </p:cNvPr>
+          <p:cNvGraphicFramePr>
+            <a:graphicFrameLocks noGrp="1"/>
+          </p:cNvGraphicFramePr>
+          <p:nvPr/>
+        </p:nvGraphicFramePr>
+        <p:xfrm>
+          <a:off x="331850" y="4638674"/>
+          <a:ext cx="2460500" cy="1854200"/>
+        </p:xfrm>
+        <a:graphic>
+          <a:graphicData uri="http://schemas.openxmlformats.org/drawingml/2006/table">
+            <a:tbl>
+              <a:tblPr firstRow="1" bandRow="1">
+                <a:tableStyleId>{21E4AEA4-8DFA-4A89-87EB-49C32662AFE0}</a:tableStyleId>
+              </a:tblPr>
+              <a:tblGrid>
+                <a:gridCol w="849414">
+                  <a:extLst>
+                    <a:ext uri="{9D8B030D-6E8A-4147-A177-3AD203B41FA5}">
+                      <a16:colId xmlns:a16="http://schemas.microsoft.com/office/drawing/2014/main" val="2769281433"/>
+                    </a:ext>
+                  </a:extLst>
+                </a:gridCol>
+                <a:gridCol w="478972">
+                  <a:extLst>
+                    <a:ext uri="{9D8B030D-6E8A-4147-A177-3AD203B41FA5}">
+                      <a16:colId xmlns:a16="http://schemas.microsoft.com/office/drawing/2014/main" val="3951885846"/>
+                    </a:ext>
+                  </a:extLst>
+                </a:gridCol>
+                <a:gridCol w="516989">
+                  <a:extLst>
+                    <a:ext uri="{9D8B030D-6E8A-4147-A177-3AD203B41FA5}">
+                      <a16:colId xmlns:a16="http://schemas.microsoft.com/office/drawing/2014/main" val="3582607100"/>
+                    </a:ext>
+                  </a:extLst>
+                </a:gridCol>
+                <a:gridCol w="615125">
+                  <a:extLst>
+                    <a:ext uri="{9D8B030D-6E8A-4147-A177-3AD203B41FA5}">
+                      <a16:colId xmlns:a16="http://schemas.microsoft.com/office/drawing/2014/main" val="1001948809"/>
+                    </a:ext>
+                  </a:extLst>
+                </a:gridCol>
+              </a:tblGrid>
+              <a:tr h="370840">
+                <a:tc>
+                  <a:txBody>
+                    <a:bodyPr/>
+                    <a:lstStyle/>
+                    <a:p>
+                      <a:r>
+                        <a:rPr lang="tr-TR" dirty="0" err="1"/>
+                        <a:t>öğr_id</a:t>
+                      </a:r>
+                      <a:endParaRPr lang="tr-TR" dirty="0"/>
+                    </a:p>
+                  </a:txBody>
+                  <a:tcPr/>
+                </a:tc>
+                <a:tc>
+                  <a:txBody>
+                    <a:bodyPr/>
+                    <a:lstStyle/>
+                    <a:p>
+                      <a:r>
+                        <a:rPr lang="tr-TR" dirty="0"/>
+                        <a:t>ad</a:t>
+                      </a:r>
+                    </a:p>
+                  </a:txBody>
+                  <a:tcPr/>
+                </a:tc>
+                <a:tc>
+                  <a:txBody>
+                    <a:bodyPr/>
+                    <a:lstStyle/>
+                    <a:p>
+                      <a:r>
+                        <a:rPr lang="tr-TR" dirty="0" err="1"/>
+                        <a:t>ort</a:t>
+                      </a:r>
+                      <a:endParaRPr lang="tr-TR" dirty="0"/>
+                    </a:p>
+                  </a:txBody>
+                  <a:tcPr/>
+                </a:tc>
+                <a:tc>
+                  <a:txBody>
+                    <a:bodyPr/>
+                    <a:lstStyle/>
+                    <a:p>
+                      <a:r>
+                        <a:rPr lang="tr-TR" dirty="0"/>
+                        <a:t>lise</a:t>
+                      </a:r>
+                    </a:p>
+                  </a:txBody>
+                  <a:tcPr/>
+                </a:tc>
+                <a:extLst>
+                  <a:ext uri="{0D108BD9-81ED-4DB2-BD59-A6C34878D82A}">
+                    <a16:rowId xmlns:a16="http://schemas.microsoft.com/office/drawing/2014/main" val="3005422436"/>
+                  </a:ext>
+                </a:extLst>
+              </a:tr>
+              <a:tr h="370840">
+                <a:tc>
+                  <a:txBody>
+                    <a:bodyPr/>
+                    <a:lstStyle/>
+                    <a:p>
+                      <a:endParaRPr lang="tr-TR"/>
+                    </a:p>
+                  </a:txBody>
+                  <a:tcPr/>
+                </a:tc>
+                <a:tc>
+                  <a:txBody>
+                    <a:bodyPr/>
+                    <a:lstStyle/>
+                    <a:p>
+                      <a:endParaRPr lang="tr-TR"/>
+                    </a:p>
+                  </a:txBody>
+                  <a:tcPr/>
+                </a:tc>
+                <a:tc>
+                  <a:txBody>
+                    <a:bodyPr/>
+                    <a:lstStyle/>
+                    <a:p>
+                      <a:endParaRPr lang="tr-TR" dirty="0"/>
+                    </a:p>
+                  </a:txBody>
+                  <a:tcPr/>
+                </a:tc>
+                <a:tc>
+                  <a:txBody>
+                    <a:bodyPr/>
+                    <a:lstStyle/>
+                    <a:p>
+                      <a:endParaRPr lang="tr-TR"/>
+                    </a:p>
+                  </a:txBody>
+                  <a:tcPr/>
+                </a:tc>
+                <a:extLst>
+                  <a:ext uri="{0D108BD9-81ED-4DB2-BD59-A6C34878D82A}">
+                    <a16:rowId xmlns:a16="http://schemas.microsoft.com/office/drawing/2014/main" val="1621253080"/>
+                  </a:ext>
+                </a:extLst>
+              </a:tr>
+              <a:tr h="370840">
+                <a:tc>
+                  <a:txBody>
+                    <a:bodyPr/>
+                    <a:lstStyle/>
+                    <a:p>
+                      <a:endParaRPr lang="tr-TR"/>
+                    </a:p>
+                  </a:txBody>
+                  <a:tcPr/>
+                </a:tc>
+                <a:tc>
+                  <a:txBody>
+                    <a:bodyPr/>
+                    <a:lstStyle/>
+                    <a:p>
+                      <a:endParaRPr lang="tr-TR"/>
+                    </a:p>
+                  </a:txBody>
+                  <a:tcPr/>
+                </a:tc>
+                <a:tc>
+                  <a:txBody>
+                    <a:bodyPr/>
+                    <a:lstStyle/>
+                    <a:p>
+                      <a:endParaRPr lang="tr-TR"/>
+                    </a:p>
+                  </a:txBody>
+                  <a:tcPr/>
+                </a:tc>
+                <a:tc>
+                  <a:txBody>
+                    <a:bodyPr/>
+                    <a:lstStyle/>
+                    <a:p>
+                      <a:endParaRPr lang="tr-TR"/>
+                    </a:p>
+                  </a:txBody>
+                  <a:tcPr/>
+                </a:tc>
+                <a:extLst>
+                  <a:ext uri="{0D108BD9-81ED-4DB2-BD59-A6C34878D82A}">
+                    <a16:rowId xmlns:a16="http://schemas.microsoft.com/office/drawing/2014/main" val="579434912"/>
+                  </a:ext>
+                </a:extLst>
+              </a:tr>
+              <a:tr h="370840">
+                <a:tc>
+                  <a:txBody>
+                    <a:bodyPr/>
+                    <a:lstStyle/>
+                    <a:p>
+                      <a:endParaRPr lang="tr-TR"/>
+                    </a:p>
+                  </a:txBody>
+                  <a:tcPr/>
+                </a:tc>
+                <a:tc>
+                  <a:txBody>
+                    <a:bodyPr/>
+                    <a:lstStyle/>
+                    <a:p>
+                      <a:endParaRPr lang="tr-TR"/>
+                    </a:p>
+                  </a:txBody>
+                  <a:tcPr/>
+                </a:tc>
+                <a:tc>
+                  <a:txBody>
+                    <a:bodyPr/>
+                    <a:lstStyle/>
+                    <a:p>
+                      <a:endParaRPr lang="tr-TR"/>
+                    </a:p>
+                  </a:txBody>
+                  <a:tcPr/>
+                </a:tc>
+                <a:tc>
+                  <a:txBody>
+                    <a:bodyPr/>
+                    <a:lstStyle/>
+                    <a:p>
+                      <a:endParaRPr lang="tr-TR"/>
+                    </a:p>
+                  </a:txBody>
+                  <a:tcPr/>
+                </a:tc>
+                <a:extLst>
+                  <a:ext uri="{0D108BD9-81ED-4DB2-BD59-A6C34878D82A}">
+                    <a16:rowId xmlns:a16="http://schemas.microsoft.com/office/drawing/2014/main" val="2998448372"/>
+                  </a:ext>
+                </a:extLst>
+              </a:tr>
+              <a:tr h="370840">
+                <a:tc>
+                  <a:txBody>
+                    <a:bodyPr/>
+                    <a:lstStyle/>
+                    <a:p>
+                      <a:endParaRPr lang="tr-TR"/>
+                    </a:p>
+                  </a:txBody>
+                  <a:tcPr/>
+                </a:tc>
+                <a:tc>
+                  <a:txBody>
+                    <a:bodyPr/>
+                    <a:lstStyle/>
+                    <a:p>
+                      <a:endParaRPr lang="tr-TR"/>
+                    </a:p>
+                  </a:txBody>
+                  <a:tcPr/>
+                </a:tc>
+                <a:tc>
+                  <a:txBody>
+                    <a:bodyPr/>
+                    <a:lstStyle/>
+                    <a:p>
+                      <a:endParaRPr lang="tr-TR"/>
+                    </a:p>
+                  </a:txBody>
+                  <a:tcPr/>
+                </a:tc>
+                <a:tc>
+                  <a:txBody>
+                    <a:bodyPr/>
+                    <a:lstStyle/>
+                    <a:p>
+                      <a:endParaRPr lang="tr-TR" dirty="0"/>
+                    </a:p>
+                  </a:txBody>
+                  <a:tcPr/>
+                </a:tc>
+                <a:extLst>
+                  <a:ext uri="{0D108BD9-81ED-4DB2-BD59-A6C34878D82A}">
+                    <a16:rowId xmlns:a16="http://schemas.microsoft.com/office/drawing/2014/main" val="1885487499"/>
+                  </a:ext>
+                </a:extLst>
+              </a:tr>
+            </a:tbl>
+          </a:graphicData>
+        </a:graphic>
+      </p:graphicFrame>
+      <p:graphicFrame>
+        <p:nvGraphicFramePr>
+          <p:cNvPr id="6" name="Table 4">
+            <a:extLst>
+              <a:ext uri="{FF2B5EF4-FFF2-40B4-BE49-F238E27FC236}">
+                <a16:creationId xmlns:a16="http://schemas.microsoft.com/office/drawing/2014/main" id="{23D5DC5A-7E27-9D04-E77C-C5803DBB824D}"/>
+              </a:ext>
+            </a:extLst>
+          </p:cNvPr>
+          <p:cNvGraphicFramePr>
+            <a:graphicFrameLocks noGrp="1"/>
+          </p:cNvGraphicFramePr>
+          <p:nvPr/>
+        </p:nvGraphicFramePr>
+        <p:xfrm>
+          <a:off x="3162136" y="4638674"/>
+          <a:ext cx="2819728" cy="1854200"/>
+        </p:xfrm>
+        <a:graphic>
+          <a:graphicData uri="http://schemas.openxmlformats.org/drawingml/2006/table">
+            <a:tbl>
+              <a:tblPr firstRow="1" bandRow="1">
+                <a:tableStyleId>{5C22544A-7EE6-4342-B048-85BDC9FD1C3A}</a:tableStyleId>
+              </a:tblPr>
+              <a:tblGrid>
+                <a:gridCol w="816757">
+                  <a:extLst>
+                    <a:ext uri="{9D8B030D-6E8A-4147-A177-3AD203B41FA5}">
+                      <a16:colId xmlns:a16="http://schemas.microsoft.com/office/drawing/2014/main" val="2769281433"/>
+                    </a:ext>
+                  </a:extLst>
+                </a:gridCol>
+                <a:gridCol w="674914">
+                  <a:extLst>
+                    <a:ext uri="{9D8B030D-6E8A-4147-A177-3AD203B41FA5}">
+                      <a16:colId xmlns:a16="http://schemas.microsoft.com/office/drawing/2014/main" val="3951885846"/>
+                    </a:ext>
+                  </a:extLst>
+                </a:gridCol>
+                <a:gridCol w="623125">
+                  <a:extLst>
+                    <a:ext uri="{9D8B030D-6E8A-4147-A177-3AD203B41FA5}">
+                      <a16:colId xmlns:a16="http://schemas.microsoft.com/office/drawing/2014/main" val="3582607100"/>
+                    </a:ext>
+                  </a:extLst>
+                </a:gridCol>
+                <a:gridCol w="704932">
+                  <a:extLst>
+                    <a:ext uri="{9D8B030D-6E8A-4147-A177-3AD203B41FA5}">
+                      <a16:colId xmlns:a16="http://schemas.microsoft.com/office/drawing/2014/main" val="1001948809"/>
+                    </a:ext>
+                  </a:extLst>
+                </a:gridCol>
+              </a:tblGrid>
+              <a:tr h="370840">
+                <a:tc>
+                  <a:txBody>
+                    <a:bodyPr/>
+                    <a:lstStyle/>
+                    <a:p>
+                      <a:r>
+                        <a:rPr lang="tr-TR" dirty="0" err="1"/>
+                        <a:t>öğr_id</a:t>
+                      </a:r>
+                      <a:endParaRPr lang="tr-TR" dirty="0"/>
+                    </a:p>
+                  </a:txBody>
+                  <a:tcPr/>
+                </a:tc>
+                <a:tc>
+                  <a:txBody>
+                    <a:bodyPr/>
+                    <a:lstStyle/>
+                    <a:p>
+                      <a:r>
+                        <a:rPr lang="tr-TR" dirty="0"/>
+                        <a:t>okul</a:t>
+                      </a:r>
+                    </a:p>
+                  </a:txBody>
+                  <a:tcPr/>
+                </a:tc>
+                <a:tc>
+                  <a:txBody>
+                    <a:bodyPr/>
+                    <a:lstStyle/>
+                    <a:p>
+                      <a:r>
+                        <a:rPr lang="tr-TR" dirty="0" err="1"/>
+                        <a:t>a.d</a:t>
+                      </a:r>
+                      <a:r>
+                        <a:rPr lang="tr-TR" dirty="0"/>
+                        <a:t>.</a:t>
+                      </a:r>
+                    </a:p>
+                  </a:txBody>
+                  <a:tcPr/>
+                </a:tc>
+                <a:tc>
+                  <a:txBody>
+                    <a:bodyPr/>
+                    <a:lstStyle/>
+                    <a:p>
+                      <a:r>
+                        <a:rPr lang="tr-TR" dirty="0"/>
+                        <a:t>karar</a:t>
+                      </a:r>
+                    </a:p>
+                  </a:txBody>
+                  <a:tcPr/>
+                </a:tc>
+                <a:extLst>
+                  <a:ext uri="{0D108BD9-81ED-4DB2-BD59-A6C34878D82A}">
+                    <a16:rowId xmlns:a16="http://schemas.microsoft.com/office/drawing/2014/main" val="3005422436"/>
+                  </a:ext>
+                </a:extLst>
+              </a:tr>
+              <a:tr h="370840">
+                <a:tc>
+                  <a:txBody>
+                    <a:bodyPr/>
+                    <a:lstStyle/>
+                    <a:p>
+                      <a:endParaRPr lang="tr-TR"/>
+                    </a:p>
+                  </a:txBody>
+                  <a:tcPr/>
+                </a:tc>
+                <a:tc>
+                  <a:txBody>
+                    <a:bodyPr/>
+                    <a:lstStyle/>
+                    <a:p>
+                      <a:endParaRPr lang="tr-TR"/>
+                    </a:p>
+                  </a:txBody>
+                  <a:tcPr/>
+                </a:tc>
+                <a:tc>
+                  <a:txBody>
+                    <a:bodyPr/>
+                    <a:lstStyle/>
+                    <a:p>
+                      <a:endParaRPr lang="tr-TR" dirty="0"/>
+                    </a:p>
+                  </a:txBody>
+                  <a:tcPr/>
+                </a:tc>
+                <a:tc>
+                  <a:txBody>
+                    <a:bodyPr/>
+                    <a:lstStyle/>
+                    <a:p>
+                      <a:endParaRPr lang="tr-TR"/>
+                    </a:p>
+                  </a:txBody>
+                  <a:tcPr/>
+                </a:tc>
+                <a:extLst>
+                  <a:ext uri="{0D108BD9-81ED-4DB2-BD59-A6C34878D82A}">
+                    <a16:rowId xmlns:a16="http://schemas.microsoft.com/office/drawing/2014/main" val="1621253080"/>
+                  </a:ext>
+                </a:extLst>
+              </a:tr>
+              <a:tr h="370840">
+                <a:tc>
+                  <a:txBody>
+                    <a:bodyPr/>
+                    <a:lstStyle/>
+                    <a:p>
+                      <a:endParaRPr lang="tr-TR" dirty="0"/>
+                    </a:p>
+                  </a:txBody>
+                  <a:tcPr/>
+                </a:tc>
+                <a:tc>
+                  <a:txBody>
+                    <a:bodyPr/>
+                    <a:lstStyle/>
+                    <a:p>
+                      <a:endParaRPr lang="tr-TR"/>
+                    </a:p>
+                  </a:txBody>
+                  <a:tcPr/>
+                </a:tc>
+                <a:tc>
+                  <a:txBody>
+                    <a:bodyPr/>
+                    <a:lstStyle/>
+                    <a:p>
+                      <a:endParaRPr lang="tr-TR" dirty="0"/>
+                    </a:p>
+                  </a:txBody>
+                  <a:tcPr/>
+                </a:tc>
+                <a:tc>
+                  <a:txBody>
+                    <a:bodyPr/>
+                    <a:lstStyle/>
+                    <a:p>
+                      <a:endParaRPr lang="tr-TR"/>
+                    </a:p>
+                  </a:txBody>
+                  <a:tcPr/>
+                </a:tc>
+                <a:extLst>
+                  <a:ext uri="{0D108BD9-81ED-4DB2-BD59-A6C34878D82A}">
+                    <a16:rowId xmlns:a16="http://schemas.microsoft.com/office/drawing/2014/main" val="579434912"/>
+                  </a:ext>
+                </a:extLst>
+              </a:tr>
+              <a:tr h="370840">
+                <a:tc>
+                  <a:txBody>
+                    <a:bodyPr/>
+                    <a:lstStyle/>
+                    <a:p>
+                      <a:endParaRPr lang="tr-TR"/>
+                    </a:p>
+                  </a:txBody>
+                  <a:tcPr/>
+                </a:tc>
+                <a:tc>
+                  <a:txBody>
+                    <a:bodyPr/>
+                    <a:lstStyle/>
+                    <a:p>
+                      <a:endParaRPr lang="tr-TR"/>
+                    </a:p>
+                  </a:txBody>
+                  <a:tcPr/>
+                </a:tc>
+                <a:tc>
+                  <a:txBody>
+                    <a:bodyPr/>
+                    <a:lstStyle/>
+                    <a:p>
+                      <a:endParaRPr lang="tr-TR"/>
+                    </a:p>
+                  </a:txBody>
+                  <a:tcPr/>
+                </a:tc>
+                <a:tc>
+                  <a:txBody>
+                    <a:bodyPr/>
+                    <a:lstStyle/>
+                    <a:p>
+                      <a:endParaRPr lang="tr-TR"/>
+                    </a:p>
+                  </a:txBody>
+                  <a:tcPr/>
+                </a:tc>
+                <a:extLst>
+                  <a:ext uri="{0D108BD9-81ED-4DB2-BD59-A6C34878D82A}">
+                    <a16:rowId xmlns:a16="http://schemas.microsoft.com/office/drawing/2014/main" val="2998448372"/>
+                  </a:ext>
+                </a:extLst>
+              </a:tr>
+              <a:tr h="370840">
+                <a:tc>
+                  <a:txBody>
+                    <a:bodyPr/>
+                    <a:lstStyle/>
+                    <a:p>
+                      <a:endParaRPr lang="tr-TR"/>
+                    </a:p>
+                  </a:txBody>
+                  <a:tcPr/>
+                </a:tc>
+                <a:tc>
+                  <a:txBody>
+                    <a:bodyPr/>
+                    <a:lstStyle/>
+                    <a:p>
+                      <a:endParaRPr lang="tr-TR"/>
+                    </a:p>
+                  </a:txBody>
+                  <a:tcPr/>
+                </a:tc>
+                <a:tc>
+                  <a:txBody>
+                    <a:bodyPr/>
+                    <a:lstStyle/>
+                    <a:p>
+                      <a:endParaRPr lang="tr-TR"/>
+                    </a:p>
+                  </a:txBody>
+                  <a:tcPr/>
+                </a:tc>
+                <a:tc>
+                  <a:txBody>
+                    <a:bodyPr/>
+                    <a:lstStyle/>
+                    <a:p>
+                      <a:endParaRPr lang="tr-TR" dirty="0"/>
+                    </a:p>
+                  </a:txBody>
+                  <a:tcPr/>
+                </a:tc>
+                <a:extLst>
+                  <a:ext uri="{0D108BD9-81ED-4DB2-BD59-A6C34878D82A}">
+                    <a16:rowId xmlns:a16="http://schemas.microsoft.com/office/drawing/2014/main" val="1885487499"/>
+                  </a:ext>
+                </a:extLst>
+              </a:tr>
+            </a:tbl>
+          </a:graphicData>
+        </a:graphic>
+      </p:graphicFrame>
+      <p:graphicFrame>
+        <p:nvGraphicFramePr>
+          <p:cNvPr id="7" name="Table 4">
+            <a:extLst>
+              <a:ext uri="{FF2B5EF4-FFF2-40B4-BE49-F238E27FC236}">
+                <a16:creationId xmlns:a16="http://schemas.microsoft.com/office/drawing/2014/main" id="{795D4326-4DC2-732B-F04D-8CCBE6219E69}"/>
+              </a:ext>
+            </a:extLst>
+          </p:cNvPr>
+          <p:cNvGraphicFramePr>
+            <a:graphicFrameLocks noGrp="1"/>
+          </p:cNvGraphicFramePr>
+          <p:nvPr/>
+        </p:nvGraphicFramePr>
+        <p:xfrm>
+          <a:off x="6264563" y="4638674"/>
+          <a:ext cx="2343479" cy="1854200"/>
+        </p:xfrm>
+        <a:graphic>
+          <a:graphicData uri="http://schemas.openxmlformats.org/drawingml/2006/table">
+            <a:tbl>
+              <a:tblPr firstRow="1" bandRow="1">
+                <a:tableStyleId>{93296810-A885-4BE3-A3E7-6D5BEEA58F35}</a:tableStyleId>
+              </a:tblPr>
+              <a:tblGrid>
+                <a:gridCol w="905077">
+                  <a:extLst>
+                    <a:ext uri="{9D8B030D-6E8A-4147-A177-3AD203B41FA5}">
+                      <a16:colId xmlns:a16="http://schemas.microsoft.com/office/drawing/2014/main" val="2769281433"/>
+                    </a:ext>
+                  </a:extLst>
+                </a:gridCol>
+                <a:gridCol w="747896">
+                  <a:extLst>
+                    <a:ext uri="{9D8B030D-6E8A-4147-A177-3AD203B41FA5}">
+                      <a16:colId xmlns:a16="http://schemas.microsoft.com/office/drawing/2014/main" val="3951885846"/>
+                    </a:ext>
+                  </a:extLst>
+                </a:gridCol>
+                <a:gridCol w="690506">
+                  <a:extLst>
+                    <a:ext uri="{9D8B030D-6E8A-4147-A177-3AD203B41FA5}">
+                      <a16:colId xmlns:a16="http://schemas.microsoft.com/office/drawing/2014/main" val="3582607100"/>
+                    </a:ext>
+                  </a:extLst>
+                </a:gridCol>
+              </a:tblGrid>
+              <a:tr h="370840">
+                <a:tc>
+                  <a:txBody>
+                    <a:bodyPr/>
+                    <a:lstStyle/>
+                    <a:p>
+                      <a:r>
+                        <a:rPr lang="tr-TR" dirty="0"/>
+                        <a:t>okul</a:t>
+                      </a:r>
+                    </a:p>
+                  </a:txBody>
+                  <a:tcPr/>
+                </a:tc>
+                <a:tc>
+                  <a:txBody>
+                    <a:bodyPr/>
+                    <a:lstStyle/>
+                    <a:p>
+                      <a:r>
+                        <a:rPr lang="tr-TR" dirty="0"/>
+                        <a:t>şehir</a:t>
+                      </a:r>
+                    </a:p>
+                  </a:txBody>
+                  <a:tcPr/>
+                </a:tc>
+                <a:tc>
+                  <a:txBody>
+                    <a:bodyPr/>
+                    <a:lstStyle/>
+                    <a:p>
+                      <a:r>
+                        <a:rPr lang="tr-TR" dirty="0" err="1"/>
+                        <a:t>mev</a:t>
+                      </a:r>
+                      <a:r>
+                        <a:rPr lang="tr-TR" dirty="0"/>
+                        <a:t>.</a:t>
+                      </a:r>
+                    </a:p>
+                  </a:txBody>
+                  <a:tcPr/>
+                </a:tc>
+                <a:extLst>
+                  <a:ext uri="{0D108BD9-81ED-4DB2-BD59-A6C34878D82A}">
+                    <a16:rowId xmlns:a16="http://schemas.microsoft.com/office/drawing/2014/main" val="3005422436"/>
+                  </a:ext>
+                </a:extLst>
+              </a:tr>
+              <a:tr h="370840">
+                <a:tc>
+                  <a:txBody>
+                    <a:bodyPr/>
+                    <a:lstStyle/>
+                    <a:p>
+                      <a:endParaRPr lang="tr-TR"/>
+                    </a:p>
+                  </a:txBody>
+                  <a:tcPr/>
+                </a:tc>
+                <a:tc>
+                  <a:txBody>
+                    <a:bodyPr/>
+                    <a:lstStyle/>
+                    <a:p>
+                      <a:endParaRPr lang="tr-TR"/>
+                    </a:p>
+                  </a:txBody>
+                  <a:tcPr/>
+                </a:tc>
+                <a:tc>
+                  <a:txBody>
+                    <a:bodyPr/>
+                    <a:lstStyle/>
+                    <a:p>
+                      <a:endParaRPr lang="tr-TR" dirty="0"/>
+                    </a:p>
+                  </a:txBody>
+                  <a:tcPr/>
+                </a:tc>
+                <a:extLst>
+                  <a:ext uri="{0D108BD9-81ED-4DB2-BD59-A6C34878D82A}">
+                    <a16:rowId xmlns:a16="http://schemas.microsoft.com/office/drawing/2014/main" val="1621253080"/>
+                  </a:ext>
+                </a:extLst>
+              </a:tr>
+              <a:tr h="370840">
+                <a:tc>
+                  <a:txBody>
+                    <a:bodyPr/>
+                    <a:lstStyle/>
+                    <a:p>
+                      <a:endParaRPr lang="tr-TR" dirty="0"/>
+                    </a:p>
+                  </a:txBody>
+                  <a:tcPr/>
+                </a:tc>
+                <a:tc>
+                  <a:txBody>
+                    <a:bodyPr/>
+                    <a:lstStyle/>
+                    <a:p>
+                      <a:endParaRPr lang="tr-TR"/>
+                    </a:p>
+                  </a:txBody>
+                  <a:tcPr/>
+                </a:tc>
+                <a:tc>
+                  <a:txBody>
+                    <a:bodyPr/>
+                    <a:lstStyle/>
+                    <a:p>
+                      <a:endParaRPr lang="tr-TR" dirty="0"/>
+                    </a:p>
+                  </a:txBody>
+                  <a:tcPr/>
+                </a:tc>
+                <a:extLst>
+                  <a:ext uri="{0D108BD9-81ED-4DB2-BD59-A6C34878D82A}">
+                    <a16:rowId xmlns:a16="http://schemas.microsoft.com/office/drawing/2014/main" val="579434912"/>
+                  </a:ext>
+                </a:extLst>
+              </a:tr>
+              <a:tr h="370840">
+                <a:tc>
+                  <a:txBody>
+                    <a:bodyPr/>
+                    <a:lstStyle/>
+                    <a:p>
+                      <a:endParaRPr lang="tr-TR"/>
+                    </a:p>
+                  </a:txBody>
+                  <a:tcPr/>
+                </a:tc>
+                <a:tc>
+                  <a:txBody>
+                    <a:bodyPr/>
+                    <a:lstStyle/>
+                    <a:p>
+                      <a:endParaRPr lang="tr-TR"/>
+                    </a:p>
+                  </a:txBody>
+                  <a:tcPr/>
+                </a:tc>
+                <a:tc>
+                  <a:txBody>
+                    <a:bodyPr/>
+                    <a:lstStyle/>
+                    <a:p>
+                      <a:endParaRPr lang="tr-TR"/>
+                    </a:p>
+                  </a:txBody>
+                  <a:tcPr/>
+                </a:tc>
+                <a:extLst>
+                  <a:ext uri="{0D108BD9-81ED-4DB2-BD59-A6C34878D82A}">
+                    <a16:rowId xmlns:a16="http://schemas.microsoft.com/office/drawing/2014/main" val="2998448372"/>
+                  </a:ext>
+                </a:extLst>
+              </a:tr>
+              <a:tr h="370840">
+                <a:tc>
+                  <a:txBody>
+                    <a:bodyPr/>
+                    <a:lstStyle/>
+                    <a:p>
+                      <a:endParaRPr lang="tr-TR"/>
+                    </a:p>
+                  </a:txBody>
+                  <a:tcPr/>
+                </a:tc>
+                <a:tc>
+                  <a:txBody>
+                    <a:bodyPr/>
+                    <a:lstStyle/>
+                    <a:p>
+                      <a:endParaRPr lang="tr-TR"/>
+                    </a:p>
+                  </a:txBody>
+                  <a:tcPr/>
+                </a:tc>
+                <a:tc>
+                  <a:txBody>
+                    <a:bodyPr/>
+                    <a:lstStyle/>
+                    <a:p>
+                      <a:endParaRPr lang="tr-TR" dirty="0"/>
+                    </a:p>
+                  </a:txBody>
+                  <a:tcPr/>
+                </a:tc>
+                <a:extLst>
+                  <a:ext uri="{0D108BD9-81ED-4DB2-BD59-A6C34878D82A}">
+                    <a16:rowId xmlns:a16="http://schemas.microsoft.com/office/drawing/2014/main" val="1885487499"/>
+                  </a:ext>
+                </a:extLst>
+              </a:tr>
+            </a:tbl>
+          </a:graphicData>
+        </a:graphic>
+      </p:graphicFrame>
+      <p:sp>
+        <p:nvSpPr>
+          <p:cNvPr id="8" name="TextBox 7">
+            <a:extLst>
+              <a:ext uri="{FF2B5EF4-FFF2-40B4-BE49-F238E27FC236}">
+                <a16:creationId xmlns:a16="http://schemas.microsoft.com/office/drawing/2014/main" id="{EF17E23C-015F-3E0B-6221-5DA04096F1B3}"/>
+              </a:ext>
+            </a:extLst>
+          </p:cNvPr>
+          <p:cNvSpPr txBox="1"/>
+          <p:nvPr/>
+        </p:nvSpPr>
+        <p:spPr>
+          <a:xfrm>
+            <a:off x="997586" y="4269342"/>
+            <a:ext cx="1129027" cy="369332"/>
+          </a:xfrm>
+          <a:prstGeom prst="rect">
+            <a:avLst/>
+          </a:prstGeom>
+          <a:noFill/>
+        </p:spPr>
+        <p:txBody>
+          <a:bodyPr wrap="none" rtlCol="0">
+            <a:spAutoFit/>
+          </a:bodyPr>
+          <a:lstStyle/>
+          <a:p>
+            <a:r>
+              <a:rPr lang="tr-TR" dirty="0"/>
+              <a:t>öğrenciler</a:t>
+            </a:r>
+          </a:p>
+        </p:txBody>
+      </p:sp>
+      <p:sp>
+        <p:nvSpPr>
+          <p:cNvPr id="9" name="TextBox 8">
+            <a:extLst>
+              <a:ext uri="{FF2B5EF4-FFF2-40B4-BE49-F238E27FC236}">
+                <a16:creationId xmlns:a16="http://schemas.microsoft.com/office/drawing/2014/main" id="{582E250B-0C4A-5435-E1B2-E9A285F65BFC}"/>
+              </a:ext>
+            </a:extLst>
+          </p:cNvPr>
+          <p:cNvSpPr txBox="1"/>
+          <p:nvPr/>
+        </p:nvSpPr>
+        <p:spPr>
+          <a:xfrm>
+            <a:off x="3984467" y="4269342"/>
+            <a:ext cx="1175065" cy="369332"/>
+          </a:xfrm>
+          <a:prstGeom prst="rect">
+            <a:avLst/>
+          </a:prstGeom>
+          <a:noFill/>
+        </p:spPr>
+        <p:txBody>
+          <a:bodyPr wrap="none" rtlCol="0">
+            <a:spAutoFit/>
+          </a:bodyPr>
+          <a:lstStyle/>
+          <a:p>
+            <a:r>
+              <a:rPr lang="tr-TR" dirty="0"/>
+              <a:t>başvurular</a:t>
+            </a:r>
+          </a:p>
+        </p:txBody>
+      </p:sp>
+      <p:sp>
+        <p:nvSpPr>
+          <p:cNvPr id="10" name="TextBox 9">
+            <a:extLst>
+              <a:ext uri="{FF2B5EF4-FFF2-40B4-BE49-F238E27FC236}">
+                <a16:creationId xmlns:a16="http://schemas.microsoft.com/office/drawing/2014/main" id="{4F17AB32-38DE-7001-563A-C344D5123D3B}"/>
+              </a:ext>
+            </a:extLst>
+          </p:cNvPr>
+          <p:cNvSpPr txBox="1"/>
+          <p:nvPr/>
+        </p:nvSpPr>
+        <p:spPr>
+          <a:xfrm>
+            <a:off x="6758424" y="4269342"/>
+            <a:ext cx="1355756" cy="369332"/>
+          </a:xfrm>
+          <a:prstGeom prst="rect">
+            <a:avLst/>
+          </a:prstGeom>
+          <a:noFill/>
+        </p:spPr>
+        <p:txBody>
+          <a:bodyPr wrap="none" rtlCol="0">
+            <a:spAutoFit/>
+          </a:bodyPr>
+          <a:lstStyle/>
+          <a:p>
+            <a:r>
+              <a:rPr lang="tr-TR" dirty="0"/>
+              <a:t>üniversiteler</a:t>
+            </a:r>
+          </a:p>
+        </p:txBody>
+      </p:sp>
+      <p:sp>
+        <p:nvSpPr>
+          <p:cNvPr id="11" name="TextBox 10">
+            <a:extLst>
+              <a:ext uri="{FF2B5EF4-FFF2-40B4-BE49-F238E27FC236}">
+                <a16:creationId xmlns:a16="http://schemas.microsoft.com/office/drawing/2014/main" id="{C40D7FBF-7E62-769B-B087-FCE7BC406C97}"/>
+              </a:ext>
+            </a:extLst>
+          </p:cNvPr>
+          <p:cNvSpPr txBox="1"/>
+          <p:nvPr/>
+        </p:nvSpPr>
+        <p:spPr>
+          <a:xfrm>
+            <a:off x="628650" y="1690689"/>
+            <a:ext cx="7979392" cy="2431435"/>
+          </a:xfrm>
+          <a:prstGeom prst="rect">
+            <a:avLst/>
+          </a:prstGeom>
+          <a:noFill/>
+        </p:spPr>
+        <p:txBody>
+          <a:bodyPr wrap="square" rtlCol="0">
+            <a:spAutoFit/>
+          </a:bodyPr>
+          <a:lstStyle/>
+          <a:p>
+            <a:r>
+              <a:rPr lang="tr-TR" sz="2800" i="1" dirty="0" err="1"/>
+              <a:t>R.A</a:t>
+            </a:r>
+            <a:r>
+              <a:rPr lang="tr-TR" sz="2800" dirty="0" err="1"/>
+              <a:t>'dan</a:t>
+            </a:r>
+            <a:r>
+              <a:rPr lang="tr-TR" sz="2800" dirty="0"/>
+              <a:t> </a:t>
+            </a:r>
+            <a:r>
+              <a:rPr lang="tr-TR" sz="2800" i="1" dirty="0" err="1"/>
+              <a:t>S.B</a:t>
+            </a:r>
+            <a:r>
+              <a:rPr lang="tr-TR" sz="2800" dirty="0" err="1"/>
+              <a:t>'ye</a:t>
+            </a:r>
+            <a:r>
+              <a:rPr lang="tr-TR" sz="2800" dirty="0"/>
+              <a:t> referans bütünlüğünün potansiyel ihlalleri:</a:t>
+            </a:r>
+          </a:p>
+          <a:p>
+            <a:pPr marL="742950" lvl="1" indent="-285750">
+              <a:buFont typeface="Arial" panose="020B0604020202020204" pitchFamily="34" charset="0"/>
+              <a:buChar char="•"/>
+            </a:pPr>
+            <a:r>
+              <a:rPr lang="tr-TR" sz="2400" dirty="0"/>
+              <a:t>R'ye insert</a:t>
+            </a:r>
+          </a:p>
+          <a:p>
+            <a:pPr marL="742950" lvl="1" indent="-285750">
+              <a:buFont typeface="Arial" panose="020B0604020202020204" pitchFamily="34" charset="0"/>
+              <a:buChar char="•"/>
+            </a:pPr>
+            <a:r>
+              <a:rPr lang="tr-TR" sz="2400" dirty="0"/>
+              <a:t>S'den </a:t>
+            </a:r>
+            <a:r>
+              <a:rPr lang="tr-TR" sz="2400" dirty="0" err="1"/>
+              <a:t>delete</a:t>
+            </a:r>
+            <a:endParaRPr lang="tr-TR" sz="2400" dirty="0"/>
+          </a:p>
+          <a:p>
+            <a:pPr marL="742950" lvl="1" indent="-285750">
+              <a:buFont typeface="Arial" panose="020B0604020202020204" pitchFamily="34" charset="0"/>
+              <a:buChar char="•"/>
+            </a:pPr>
+            <a:r>
+              <a:rPr lang="tr-TR" sz="2400" dirty="0" err="1"/>
+              <a:t>R.A'yı</a:t>
+            </a:r>
+            <a:r>
+              <a:rPr lang="tr-TR" sz="2400" dirty="0"/>
+              <a:t> </a:t>
+            </a:r>
+            <a:r>
+              <a:rPr lang="tr-TR" sz="2400" dirty="0" err="1"/>
+              <a:t>update</a:t>
+            </a:r>
+            <a:endParaRPr lang="tr-TR" sz="2400" dirty="0"/>
+          </a:p>
+          <a:p>
+            <a:pPr marL="742950" lvl="1" indent="-285750">
+              <a:buFont typeface="Arial" panose="020B0604020202020204" pitchFamily="34" charset="0"/>
+              <a:buChar char="•"/>
+            </a:pPr>
+            <a:r>
+              <a:rPr lang="tr-TR" sz="2400" dirty="0" err="1"/>
+              <a:t>S.B'yi</a:t>
+            </a:r>
+            <a:r>
+              <a:rPr lang="tr-TR" sz="2400" dirty="0"/>
+              <a:t> </a:t>
+            </a:r>
+            <a:r>
+              <a:rPr lang="tr-TR" sz="2400" dirty="0" err="1"/>
+              <a:t>update</a:t>
+            </a:r>
+            <a:endParaRPr lang="tr-TR" sz="2400" dirty="0"/>
+          </a:p>
+        </p:txBody>
+      </p:sp>
+    </p:spTree>
+    <p:extLst>
+      <p:ext uri="{BB962C8B-B14F-4D97-AF65-F5344CB8AC3E}">
+        <p14:creationId xmlns:p14="http://schemas.microsoft.com/office/powerpoint/2010/main" val="1602008314"/>
+      </p:ext>
+    </p:extLst>
+  </p:cSld>
+  <p:clrMapOvr>
+    <a:masterClrMapping/>
+  </p:clrMapOvr>
+</p:sld>
+</file>
+
+<file path=ppt/slides/slide6.xml><?xml version="1.0" encoding="utf-8"?>
+<p:sld xmlns:a="http://schemas.openxmlformats.org/drawingml/2006/main" xmlns:r="http://schemas.openxmlformats.org/officeDocument/2006/relationships" xmlns:p="http://schemas.openxmlformats.org/presentationml/2006/main">
+  <p:cSld>
+    <p:spTree>
+      <p:nvGrpSpPr>
+        <p:cNvPr id="1" name=""/>
+        <p:cNvGrpSpPr/>
+        <p:nvPr/>
+      </p:nvGrpSpPr>
+      <p:grpSpPr>
+        <a:xfrm>
+          <a:off x="0" y="0"/>
+          <a:ext cx="0" cy="0"/>
+          <a:chOff x="0" y="0"/>
+          <a:chExt cx="0" cy="0"/>
+        </a:xfrm>
+      </p:grpSpPr>
+      <p:sp>
+        <p:nvSpPr>
+          <p:cNvPr id="2" name="Title 1">
+            <a:extLst>
+              <a:ext uri="{FF2B5EF4-FFF2-40B4-BE49-F238E27FC236}">
+                <a16:creationId xmlns:a16="http://schemas.microsoft.com/office/drawing/2014/main" id="{D1B8C2F0-24BC-60BB-78E8-0CA1B08AE1E2}"/>
+              </a:ext>
+            </a:extLst>
+          </p:cNvPr>
+          <p:cNvSpPr>
+            <a:spLocks noGrp="1"/>
+          </p:cNvSpPr>
+          <p:nvPr>
+            <p:ph type="title"/>
+          </p:nvPr>
+        </p:nvSpPr>
+        <p:spPr/>
+        <p:txBody>
+          <a:bodyPr/>
+          <a:lstStyle/>
+          <a:p>
+            <a:r>
+              <a:rPr lang="tr-TR" dirty="0"/>
+              <a:t>Referans Bütünlüğü Kısıtlamaları</a:t>
+            </a:r>
+          </a:p>
+        </p:txBody>
+      </p:sp>
+      <p:graphicFrame>
+        <p:nvGraphicFramePr>
+          <p:cNvPr id="4" name="Table 4">
+            <a:extLst>
+              <a:ext uri="{FF2B5EF4-FFF2-40B4-BE49-F238E27FC236}">
+                <a16:creationId xmlns:a16="http://schemas.microsoft.com/office/drawing/2014/main" id="{10F33175-0A77-E573-D794-E0B87B54A8EA}"/>
+              </a:ext>
+            </a:extLst>
+          </p:cNvPr>
+          <p:cNvGraphicFramePr>
+            <a:graphicFrameLocks noGrp="1"/>
+          </p:cNvGraphicFramePr>
+          <p:nvPr/>
+        </p:nvGraphicFramePr>
+        <p:xfrm>
+          <a:off x="331850" y="4638674"/>
+          <a:ext cx="2460500" cy="1854200"/>
+        </p:xfrm>
+        <a:graphic>
+          <a:graphicData uri="http://schemas.openxmlformats.org/drawingml/2006/table">
+            <a:tbl>
+              <a:tblPr firstRow="1" bandRow="1">
+                <a:tableStyleId>{21E4AEA4-8DFA-4A89-87EB-49C32662AFE0}</a:tableStyleId>
+              </a:tblPr>
+              <a:tblGrid>
+                <a:gridCol w="849414">
+                  <a:extLst>
+                    <a:ext uri="{9D8B030D-6E8A-4147-A177-3AD203B41FA5}">
+                      <a16:colId xmlns:a16="http://schemas.microsoft.com/office/drawing/2014/main" val="2769281433"/>
+                    </a:ext>
+                  </a:extLst>
+                </a:gridCol>
+                <a:gridCol w="478972">
+                  <a:extLst>
+                    <a:ext uri="{9D8B030D-6E8A-4147-A177-3AD203B41FA5}">
+                      <a16:colId xmlns:a16="http://schemas.microsoft.com/office/drawing/2014/main" val="3951885846"/>
+                    </a:ext>
+                  </a:extLst>
+                </a:gridCol>
+                <a:gridCol w="516989">
+                  <a:extLst>
+                    <a:ext uri="{9D8B030D-6E8A-4147-A177-3AD203B41FA5}">
+                      <a16:colId xmlns:a16="http://schemas.microsoft.com/office/drawing/2014/main" val="3582607100"/>
+                    </a:ext>
+                  </a:extLst>
+                </a:gridCol>
+                <a:gridCol w="615125">
+                  <a:extLst>
+                    <a:ext uri="{9D8B030D-6E8A-4147-A177-3AD203B41FA5}">
+                      <a16:colId xmlns:a16="http://schemas.microsoft.com/office/drawing/2014/main" val="1001948809"/>
+                    </a:ext>
+                  </a:extLst>
+                </a:gridCol>
+              </a:tblGrid>
+              <a:tr h="370840">
+                <a:tc>
+                  <a:txBody>
+                    <a:bodyPr/>
+                    <a:lstStyle/>
+                    <a:p>
+                      <a:r>
+                        <a:rPr lang="tr-TR" dirty="0" err="1"/>
+                        <a:t>öğr_id</a:t>
+                      </a:r>
+                      <a:endParaRPr lang="tr-TR" dirty="0"/>
+                    </a:p>
+                  </a:txBody>
+                  <a:tcPr/>
+                </a:tc>
+                <a:tc>
+                  <a:txBody>
+                    <a:bodyPr/>
+                    <a:lstStyle/>
+                    <a:p>
+                      <a:r>
+                        <a:rPr lang="tr-TR" dirty="0"/>
+                        <a:t>ad</a:t>
+                      </a:r>
+                    </a:p>
+                  </a:txBody>
+                  <a:tcPr/>
+                </a:tc>
+                <a:tc>
+                  <a:txBody>
+                    <a:bodyPr/>
+                    <a:lstStyle/>
+                    <a:p>
+                      <a:r>
+                        <a:rPr lang="tr-TR" dirty="0" err="1"/>
+                        <a:t>ort</a:t>
+                      </a:r>
+                      <a:endParaRPr lang="tr-TR" dirty="0"/>
+                    </a:p>
+                  </a:txBody>
+                  <a:tcPr/>
+                </a:tc>
+                <a:tc>
+                  <a:txBody>
+                    <a:bodyPr/>
+                    <a:lstStyle/>
+                    <a:p>
+                      <a:r>
+                        <a:rPr lang="tr-TR" dirty="0"/>
+                        <a:t>lise</a:t>
+                      </a:r>
+                    </a:p>
+                  </a:txBody>
+                  <a:tcPr/>
+                </a:tc>
+                <a:extLst>
+                  <a:ext uri="{0D108BD9-81ED-4DB2-BD59-A6C34878D82A}">
+                    <a16:rowId xmlns:a16="http://schemas.microsoft.com/office/drawing/2014/main" val="3005422436"/>
+                  </a:ext>
+                </a:extLst>
+              </a:tr>
+              <a:tr h="370840">
+                <a:tc>
+                  <a:txBody>
+                    <a:bodyPr/>
+                    <a:lstStyle/>
+                    <a:p>
+                      <a:endParaRPr lang="tr-TR"/>
+                    </a:p>
+                  </a:txBody>
+                  <a:tcPr/>
+                </a:tc>
+                <a:tc>
+                  <a:txBody>
+                    <a:bodyPr/>
+                    <a:lstStyle/>
+                    <a:p>
+                      <a:endParaRPr lang="tr-TR"/>
+                    </a:p>
+                  </a:txBody>
+                  <a:tcPr/>
+                </a:tc>
+                <a:tc>
+                  <a:txBody>
+                    <a:bodyPr/>
+                    <a:lstStyle/>
+                    <a:p>
+                      <a:endParaRPr lang="tr-TR" dirty="0"/>
+                    </a:p>
+                  </a:txBody>
+                  <a:tcPr/>
+                </a:tc>
+                <a:tc>
+                  <a:txBody>
+                    <a:bodyPr/>
+                    <a:lstStyle/>
+                    <a:p>
+                      <a:endParaRPr lang="tr-TR"/>
+                    </a:p>
+                  </a:txBody>
+                  <a:tcPr/>
+                </a:tc>
+                <a:extLst>
+                  <a:ext uri="{0D108BD9-81ED-4DB2-BD59-A6C34878D82A}">
+                    <a16:rowId xmlns:a16="http://schemas.microsoft.com/office/drawing/2014/main" val="1621253080"/>
+                  </a:ext>
+                </a:extLst>
+              </a:tr>
+              <a:tr h="370840">
+                <a:tc>
+                  <a:txBody>
+                    <a:bodyPr/>
+                    <a:lstStyle/>
+                    <a:p>
+                      <a:endParaRPr lang="tr-TR"/>
+                    </a:p>
+                  </a:txBody>
+                  <a:tcPr/>
+                </a:tc>
+                <a:tc>
+                  <a:txBody>
+                    <a:bodyPr/>
+                    <a:lstStyle/>
+                    <a:p>
+                      <a:endParaRPr lang="tr-TR"/>
+                    </a:p>
+                  </a:txBody>
+                  <a:tcPr/>
+                </a:tc>
+                <a:tc>
+                  <a:txBody>
+                    <a:bodyPr/>
+                    <a:lstStyle/>
+                    <a:p>
+                      <a:endParaRPr lang="tr-TR"/>
+                    </a:p>
+                  </a:txBody>
+                  <a:tcPr/>
+                </a:tc>
+                <a:tc>
+                  <a:txBody>
+                    <a:bodyPr/>
+                    <a:lstStyle/>
+                    <a:p>
+                      <a:endParaRPr lang="tr-TR"/>
+                    </a:p>
+                  </a:txBody>
+                  <a:tcPr/>
+                </a:tc>
+                <a:extLst>
+                  <a:ext uri="{0D108BD9-81ED-4DB2-BD59-A6C34878D82A}">
+                    <a16:rowId xmlns:a16="http://schemas.microsoft.com/office/drawing/2014/main" val="579434912"/>
+                  </a:ext>
+                </a:extLst>
+              </a:tr>
+              <a:tr h="370840">
+                <a:tc>
+                  <a:txBody>
+                    <a:bodyPr/>
+                    <a:lstStyle/>
+                    <a:p>
+                      <a:endParaRPr lang="tr-TR"/>
+                    </a:p>
+                  </a:txBody>
+                  <a:tcPr/>
+                </a:tc>
+                <a:tc>
+                  <a:txBody>
+                    <a:bodyPr/>
+                    <a:lstStyle/>
+                    <a:p>
+                      <a:endParaRPr lang="tr-TR"/>
+                    </a:p>
+                  </a:txBody>
+                  <a:tcPr/>
+                </a:tc>
+                <a:tc>
+                  <a:txBody>
+                    <a:bodyPr/>
+                    <a:lstStyle/>
+                    <a:p>
+                      <a:endParaRPr lang="tr-TR"/>
+                    </a:p>
+                  </a:txBody>
+                  <a:tcPr/>
+                </a:tc>
+                <a:tc>
+                  <a:txBody>
+                    <a:bodyPr/>
+                    <a:lstStyle/>
+                    <a:p>
+                      <a:endParaRPr lang="tr-TR"/>
+                    </a:p>
+                  </a:txBody>
+                  <a:tcPr/>
+                </a:tc>
+                <a:extLst>
+                  <a:ext uri="{0D108BD9-81ED-4DB2-BD59-A6C34878D82A}">
+                    <a16:rowId xmlns:a16="http://schemas.microsoft.com/office/drawing/2014/main" val="2998448372"/>
+                  </a:ext>
+                </a:extLst>
+              </a:tr>
+              <a:tr h="370840">
+                <a:tc>
+                  <a:txBody>
+                    <a:bodyPr/>
+                    <a:lstStyle/>
+                    <a:p>
+                      <a:endParaRPr lang="tr-TR"/>
+                    </a:p>
+                  </a:txBody>
+                  <a:tcPr/>
+                </a:tc>
+                <a:tc>
+                  <a:txBody>
+                    <a:bodyPr/>
+                    <a:lstStyle/>
+                    <a:p>
+                      <a:endParaRPr lang="tr-TR"/>
+                    </a:p>
+                  </a:txBody>
+                  <a:tcPr/>
+                </a:tc>
+                <a:tc>
+                  <a:txBody>
+                    <a:bodyPr/>
+                    <a:lstStyle/>
+                    <a:p>
+                      <a:endParaRPr lang="tr-TR"/>
+                    </a:p>
+                  </a:txBody>
+                  <a:tcPr/>
+                </a:tc>
+                <a:tc>
+                  <a:txBody>
+                    <a:bodyPr/>
+                    <a:lstStyle/>
+                    <a:p>
+                      <a:endParaRPr lang="tr-TR" dirty="0"/>
+                    </a:p>
+                  </a:txBody>
+                  <a:tcPr/>
+                </a:tc>
+                <a:extLst>
+                  <a:ext uri="{0D108BD9-81ED-4DB2-BD59-A6C34878D82A}">
+                    <a16:rowId xmlns:a16="http://schemas.microsoft.com/office/drawing/2014/main" val="1885487499"/>
+                  </a:ext>
+                </a:extLst>
+              </a:tr>
+            </a:tbl>
+          </a:graphicData>
+        </a:graphic>
+      </p:graphicFrame>
+      <p:graphicFrame>
+        <p:nvGraphicFramePr>
+          <p:cNvPr id="6" name="Table 4">
+            <a:extLst>
+              <a:ext uri="{FF2B5EF4-FFF2-40B4-BE49-F238E27FC236}">
+                <a16:creationId xmlns:a16="http://schemas.microsoft.com/office/drawing/2014/main" id="{23D5DC5A-7E27-9D04-E77C-C5803DBB824D}"/>
+              </a:ext>
+            </a:extLst>
+          </p:cNvPr>
+          <p:cNvGraphicFramePr>
+            <a:graphicFrameLocks noGrp="1"/>
+          </p:cNvGraphicFramePr>
+          <p:nvPr/>
+        </p:nvGraphicFramePr>
+        <p:xfrm>
+          <a:off x="3162136" y="4638674"/>
+          <a:ext cx="2819728" cy="1854200"/>
+        </p:xfrm>
+        <a:graphic>
+          <a:graphicData uri="http://schemas.openxmlformats.org/drawingml/2006/table">
+            <a:tbl>
+              <a:tblPr firstRow="1" bandRow="1">
+                <a:tableStyleId>{5C22544A-7EE6-4342-B048-85BDC9FD1C3A}</a:tableStyleId>
+              </a:tblPr>
+              <a:tblGrid>
+                <a:gridCol w="816757">
+                  <a:extLst>
+                    <a:ext uri="{9D8B030D-6E8A-4147-A177-3AD203B41FA5}">
+                      <a16:colId xmlns:a16="http://schemas.microsoft.com/office/drawing/2014/main" val="2769281433"/>
+                    </a:ext>
+                  </a:extLst>
+                </a:gridCol>
+                <a:gridCol w="674914">
+                  <a:extLst>
+                    <a:ext uri="{9D8B030D-6E8A-4147-A177-3AD203B41FA5}">
+                      <a16:colId xmlns:a16="http://schemas.microsoft.com/office/drawing/2014/main" val="3951885846"/>
+                    </a:ext>
+                  </a:extLst>
+                </a:gridCol>
+                <a:gridCol w="623125">
+                  <a:extLst>
+                    <a:ext uri="{9D8B030D-6E8A-4147-A177-3AD203B41FA5}">
+                      <a16:colId xmlns:a16="http://schemas.microsoft.com/office/drawing/2014/main" val="3582607100"/>
+                    </a:ext>
+                  </a:extLst>
+                </a:gridCol>
+                <a:gridCol w="704932">
+                  <a:extLst>
+                    <a:ext uri="{9D8B030D-6E8A-4147-A177-3AD203B41FA5}">
+                      <a16:colId xmlns:a16="http://schemas.microsoft.com/office/drawing/2014/main" val="1001948809"/>
+                    </a:ext>
+                  </a:extLst>
+                </a:gridCol>
+              </a:tblGrid>
+              <a:tr h="370840">
+                <a:tc>
+                  <a:txBody>
+                    <a:bodyPr/>
+                    <a:lstStyle/>
+                    <a:p>
+                      <a:r>
+                        <a:rPr lang="tr-TR" dirty="0" err="1"/>
+                        <a:t>öğr_id</a:t>
+                      </a:r>
+                      <a:endParaRPr lang="tr-TR" dirty="0"/>
+                    </a:p>
+                  </a:txBody>
+                  <a:tcPr/>
+                </a:tc>
+                <a:tc>
+                  <a:txBody>
+                    <a:bodyPr/>
+                    <a:lstStyle/>
+                    <a:p>
+                      <a:r>
+                        <a:rPr lang="tr-TR" dirty="0"/>
+                        <a:t>okul</a:t>
+                      </a:r>
+                    </a:p>
+                  </a:txBody>
+                  <a:tcPr/>
+                </a:tc>
+                <a:tc>
+                  <a:txBody>
+                    <a:bodyPr/>
+                    <a:lstStyle/>
+                    <a:p>
+                      <a:r>
+                        <a:rPr lang="tr-TR" dirty="0" err="1"/>
+                        <a:t>a.d</a:t>
+                      </a:r>
+                      <a:r>
+                        <a:rPr lang="tr-TR" dirty="0"/>
+                        <a:t>.</a:t>
+                      </a:r>
+                    </a:p>
+                  </a:txBody>
+                  <a:tcPr/>
+                </a:tc>
+                <a:tc>
+                  <a:txBody>
+                    <a:bodyPr/>
+                    <a:lstStyle/>
+                    <a:p>
+                      <a:r>
+                        <a:rPr lang="tr-TR" dirty="0"/>
+                        <a:t>karar</a:t>
+                      </a:r>
+                    </a:p>
+                  </a:txBody>
+                  <a:tcPr/>
+                </a:tc>
+                <a:extLst>
+                  <a:ext uri="{0D108BD9-81ED-4DB2-BD59-A6C34878D82A}">
+                    <a16:rowId xmlns:a16="http://schemas.microsoft.com/office/drawing/2014/main" val="3005422436"/>
+                  </a:ext>
+                </a:extLst>
+              </a:tr>
+              <a:tr h="370840">
+                <a:tc>
+                  <a:txBody>
+                    <a:bodyPr/>
+                    <a:lstStyle/>
+                    <a:p>
+                      <a:endParaRPr lang="tr-TR"/>
+                    </a:p>
+                  </a:txBody>
+                  <a:tcPr/>
+                </a:tc>
+                <a:tc>
+                  <a:txBody>
+                    <a:bodyPr/>
+                    <a:lstStyle/>
+                    <a:p>
+                      <a:endParaRPr lang="tr-TR"/>
+                    </a:p>
+                  </a:txBody>
+                  <a:tcPr/>
+                </a:tc>
+                <a:tc>
+                  <a:txBody>
+                    <a:bodyPr/>
+                    <a:lstStyle/>
+                    <a:p>
+                      <a:endParaRPr lang="tr-TR" dirty="0"/>
+                    </a:p>
+                  </a:txBody>
+                  <a:tcPr/>
+                </a:tc>
+                <a:tc>
+                  <a:txBody>
+                    <a:bodyPr/>
+                    <a:lstStyle/>
+                    <a:p>
+                      <a:endParaRPr lang="tr-TR"/>
+                    </a:p>
+                  </a:txBody>
+                  <a:tcPr/>
+                </a:tc>
+                <a:extLst>
+                  <a:ext uri="{0D108BD9-81ED-4DB2-BD59-A6C34878D82A}">
+                    <a16:rowId xmlns:a16="http://schemas.microsoft.com/office/drawing/2014/main" val="1621253080"/>
+                  </a:ext>
+                </a:extLst>
+              </a:tr>
+              <a:tr h="370840">
+                <a:tc>
+                  <a:txBody>
+                    <a:bodyPr/>
+                    <a:lstStyle/>
+                    <a:p>
+                      <a:endParaRPr lang="tr-TR" dirty="0"/>
+                    </a:p>
+                  </a:txBody>
+                  <a:tcPr/>
+                </a:tc>
+                <a:tc>
+                  <a:txBody>
+                    <a:bodyPr/>
+                    <a:lstStyle/>
+                    <a:p>
+                      <a:endParaRPr lang="tr-TR"/>
+                    </a:p>
+                  </a:txBody>
+                  <a:tcPr/>
+                </a:tc>
+                <a:tc>
+                  <a:txBody>
+                    <a:bodyPr/>
+                    <a:lstStyle/>
+                    <a:p>
+                      <a:endParaRPr lang="tr-TR" dirty="0"/>
+                    </a:p>
+                  </a:txBody>
+                  <a:tcPr/>
+                </a:tc>
+                <a:tc>
+                  <a:txBody>
+                    <a:bodyPr/>
+                    <a:lstStyle/>
+                    <a:p>
+                      <a:endParaRPr lang="tr-TR"/>
+                    </a:p>
+                  </a:txBody>
+                  <a:tcPr/>
+                </a:tc>
+                <a:extLst>
+                  <a:ext uri="{0D108BD9-81ED-4DB2-BD59-A6C34878D82A}">
+                    <a16:rowId xmlns:a16="http://schemas.microsoft.com/office/drawing/2014/main" val="579434912"/>
+                  </a:ext>
+                </a:extLst>
+              </a:tr>
+              <a:tr h="370840">
+                <a:tc>
+                  <a:txBody>
+                    <a:bodyPr/>
+                    <a:lstStyle/>
+                    <a:p>
+                      <a:endParaRPr lang="tr-TR"/>
+                    </a:p>
+                  </a:txBody>
+                  <a:tcPr/>
+                </a:tc>
+                <a:tc>
+                  <a:txBody>
+                    <a:bodyPr/>
+                    <a:lstStyle/>
+                    <a:p>
+                      <a:endParaRPr lang="tr-TR"/>
+                    </a:p>
+                  </a:txBody>
+                  <a:tcPr/>
+                </a:tc>
+                <a:tc>
+                  <a:txBody>
+                    <a:bodyPr/>
+                    <a:lstStyle/>
+                    <a:p>
+                      <a:endParaRPr lang="tr-TR"/>
+                    </a:p>
+                  </a:txBody>
+                  <a:tcPr/>
+                </a:tc>
+                <a:tc>
+                  <a:txBody>
+                    <a:bodyPr/>
+                    <a:lstStyle/>
+                    <a:p>
+                      <a:endParaRPr lang="tr-TR"/>
+                    </a:p>
+                  </a:txBody>
+                  <a:tcPr/>
+                </a:tc>
+                <a:extLst>
+                  <a:ext uri="{0D108BD9-81ED-4DB2-BD59-A6C34878D82A}">
+                    <a16:rowId xmlns:a16="http://schemas.microsoft.com/office/drawing/2014/main" val="2998448372"/>
+                  </a:ext>
+                </a:extLst>
+              </a:tr>
+              <a:tr h="370840">
+                <a:tc>
+                  <a:txBody>
+                    <a:bodyPr/>
+                    <a:lstStyle/>
+                    <a:p>
+                      <a:endParaRPr lang="tr-TR"/>
+                    </a:p>
+                  </a:txBody>
+                  <a:tcPr/>
+                </a:tc>
+                <a:tc>
+                  <a:txBody>
+                    <a:bodyPr/>
+                    <a:lstStyle/>
+                    <a:p>
+                      <a:endParaRPr lang="tr-TR"/>
+                    </a:p>
+                  </a:txBody>
+                  <a:tcPr/>
+                </a:tc>
+                <a:tc>
+                  <a:txBody>
+                    <a:bodyPr/>
+                    <a:lstStyle/>
+                    <a:p>
+                      <a:endParaRPr lang="tr-TR"/>
+                    </a:p>
+                  </a:txBody>
+                  <a:tcPr/>
+                </a:tc>
+                <a:tc>
+                  <a:txBody>
+                    <a:bodyPr/>
+                    <a:lstStyle/>
+                    <a:p>
+                      <a:endParaRPr lang="tr-TR" dirty="0"/>
+                    </a:p>
+                  </a:txBody>
+                  <a:tcPr/>
+                </a:tc>
+                <a:extLst>
+                  <a:ext uri="{0D108BD9-81ED-4DB2-BD59-A6C34878D82A}">
+                    <a16:rowId xmlns:a16="http://schemas.microsoft.com/office/drawing/2014/main" val="1885487499"/>
+                  </a:ext>
+                </a:extLst>
+              </a:tr>
+            </a:tbl>
+          </a:graphicData>
+        </a:graphic>
+      </p:graphicFrame>
+      <p:graphicFrame>
+        <p:nvGraphicFramePr>
+          <p:cNvPr id="7" name="Table 4">
+            <a:extLst>
+              <a:ext uri="{FF2B5EF4-FFF2-40B4-BE49-F238E27FC236}">
+                <a16:creationId xmlns:a16="http://schemas.microsoft.com/office/drawing/2014/main" id="{795D4326-4DC2-732B-F04D-8CCBE6219E69}"/>
+              </a:ext>
+            </a:extLst>
+          </p:cNvPr>
+          <p:cNvGraphicFramePr>
+            <a:graphicFrameLocks noGrp="1"/>
+          </p:cNvGraphicFramePr>
+          <p:nvPr/>
+        </p:nvGraphicFramePr>
+        <p:xfrm>
+          <a:off x="6264563" y="4638674"/>
+          <a:ext cx="2343479" cy="1854200"/>
+        </p:xfrm>
+        <a:graphic>
+          <a:graphicData uri="http://schemas.openxmlformats.org/drawingml/2006/table">
+            <a:tbl>
+              <a:tblPr firstRow="1" bandRow="1">
+                <a:tableStyleId>{93296810-A885-4BE3-A3E7-6D5BEEA58F35}</a:tableStyleId>
+              </a:tblPr>
+              <a:tblGrid>
+                <a:gridCol w="905077">
+                  <a:extLst>
+                    <a:ext uri="{9D8B030D-6E8A-4147-A177-3AD203B41FA5}">
+                      <a16:colId xmlns:a16="http://schemas.microsoft.com/office/drawing/2014/main" val="2769281433"/>
+                    </a:ext>
+                  </a:extLst>
+                </a:gridCol>
+                <a:gridCol w="747896">
+                  <a:extLst>
+                    <a:ext uri="{9D8B030D-6E8A-4147-A177-3AD203B41FA5}">
+                      <a16:colId xmlns:a16="http://schemas.microsoft.com/office/drawing/2014/main" val="3951885846"/>
+                    </a:ext>
+                  </a:extLst>
+                </a:gridCol>
+                <a:gridCol w="690506">
+                  <a:extLst>
+                    <a:ext uri="{9D8B030D-6E8A-4147-A177-3AD203B41FA5}">
+                      <a16:colId xmlns:a16="http://schemas.microsoft.com/office/drawing/2014/main" val="3582607100"/>
+                    </a:ext>
+                  </a:extLst>
+                </a:gridCol>
+              </a:tblGrid>
+              <a:tr h="370840">
+                <a:tc>
+                  <a:txBody>
+                    <a:bodyPr/>
+                    <a:lstStyle/>
+                    <a:p>
+                      <a:r>
+                        <a:rPr lang="tr-TR" dirty="0"/>
+                        <a:t>okul</a:t>
+                      </a:r>
+                    </a:p>
+                  </a:txBody>
+                  <a:tcPr/>
+                </a:tc>
+                <a:tc>
+                  <a:txBody>
+                    <a:bodyPr/>
+                    <a:lstStyle/>
+                    <a:p>
+                      <a:r>
+                        <a:rPr lang="tr-TR" dirty="0"/>
+                        <a:t>şehir</a:t>
+                      </a:r>
+                    </a:p>
+                  </a:txBody>
+                  <a:tcPr/>
+                </a:tc>
+                <a:tc>
+                  <a:txBody>
+                    <a:bodyPr/>
+                    <a:lstStyle/>
+                    <a:p>
+                      <a:r>
+                        <a:rPr lang="tr-TR" dirty="0" err="1"/>
+                        <a:t>mev</a:t>
+                      </a:r>
+                      <a:r>
+                        <a:rPr lang="tr-TR" dirty="0"/>
+                        <a:t>.</a:t>
+                      </a:r>
+                    </a:p>
+                  </a:txBody>
+                  <a:tcPr/>
+                </a:tc>
+                <a:extLst>
+                  <a:ext uri="{0D108BD9-81ED-4DB2-BD59-A6C34878D82A}">
+                    <a16:rowId xmlns:a16="http://schemas.microsoft.com/office/drawing/2014/main" val="3005422436"/>
+                  </a:ext>
+                </a:extLst>
+              </a:tr>
+              <a:tr h="370840">
+                <a:tc>
+                  <a:txBody>
+                    <a:bodyPr/>
+                    <a:lstStyle/>
+                    <a:p>
+                      <a:endParaRPr lang="tr-TR"/>
+                    </a:p>
+                  </a:txBody>
+                  <a:tcPr/>
+                </a:tc>
+                <a:tc>
+                  <a:txBody>
+                    <a:bodyPr/>
+                    <a:lstStyle/>
+                    <a:p>
+                      <a:endParaRPr lang="tr-TR"/>
+                    </a:p>
+                  </a:txBody>
+                  <a:tcPr/>
+                </a:tc>
+                <a:tc>
+                  <a:txBody>
+                    <a:bodyPr/>
+                    <a:lstStyle/>
+                    <a:p>
+                      <a:endParaRPr lang="tr-TR" dirty="0"/>
+                    </a:p>
+                  </a:txBody>
+                  <a:tcPr/>
+                </a:tc>
+                <a:extLst>
+                  <a:ext uri="{0D108BD9-81ED-4DB2-BD59-A6C34878D82A}">
+                    <a16:rowId xmlns:a16="http://schemas.microsoft.com/office/drawing/2014/main" val="1621253080"/>
+                  </a:ext>
+                </a:extLst>
+              </a:tr>
+              <a:tr h="370840">
+                <a:tc>
+                  <a:txBody>
+                    <a:bodyPr/>
+                    <a:lstStyle/>
+                    <a:p>
+                      <a:endParaRPr lang="tr-TR" dirty="0"/>
+                    </a:p>
+                  </a:txBody>
+                  <a:tcPr/>
+                </a:tc>
+                <a:tc>
+                  <a:txBody>
+                    <a:bodyPr/>
+                    <a:lstStyle/>
+                    <a:p>
+                      <a:endParaRPr lang="tr-TR"/>
+                    </a:p>
+                  </a:txBody>
+                  <a:tcPr/>
+                </a:tc>
+                <a:tc>
+                  <a:txBody>
+                    <a:bodyPr/>
+                    <a:lstStyle/>
+                    <a:p>
+                      <a:endParaRPr lang="tr-TR" dirty="0"/>
+                    </a:p>
+                  </a:txBody>
+                  <a:tcPr/>
+                </a:tc>
+                <a:extLst>
+                  <a:ext uri="{0D108BD9-81ED-4DB2-BD59-A6C34878D82A}">
+                    <a16:rowId xmlns:a16="http://schemas.microsoft.com/office/drawing/2014/main" val="579434912"/>
+                  </a:ext>
+                </a:extLst>
+              </a:tr>
+              <a:tr h="370840">
+                <a:tc>
+                  <a:txBody>
+                    <a:bodyPr/>
+                    <a:lstStyle/>
+                    <a:p>
+                      <a:endParaRPr lang="tr-TR"/>
+                    </a:p>
+                  </a:txBody>
+                  <a:tcPr/>
+                </a:tc>
+                <a:tc>
+                  <a:txBody>
+                    <a:bodyPr/>
+                    <a:lstStyle/>
+                    <a:p>
+                      <a:endParaRPr lang="tr-TR"/>
+                    </a:p>
+                  </a:txBody>
+                  <a:tcPr/>
+                </a:tc>
+                <a:tc>
+                  <a:txBody>
+                    <a:bodyPr/>
+                    <a:lstStyle/>
+                    <a:p>
+                      <a:endParaRPr lang="tr-TR"/>
+                    </a:p>
+                  </a:txBody>
+                  <a:tcPr/>
+                </a:tc>
+                <a:extLst>
+                  <a:ext uri="{0D108BD9-81ED-4DB2-BD59-A6C34878D82A}">
+                    <a16:rowId xmlns:a16="http://schemas.microsoft.com/office/drawing/2014/main" val="2998448372"/>
+                  </a:ext>
+                </a:extLst>
+              </a:tr>
+              <a:tr h="370840">
+                <a:tc>
+                  <a:txBody>
+                    <a:bodyPr/>
+                    <a:lstStyle/>
+                    <a:p>
+                      <a:endParaRPr lang="tr-TR"/>
+                    </a:p>
+                  </a:txBody>
+                  <a:tcPr/>
+                </a:tc>
+                <a:tc>
+                  <a:txBody>
+                    <a:bodyPr/>
+                    <a:lstStyle/>
+                    <a:p>
+                      <a:endParaRPr lang="tr-TR"/>
+                    </a:p>
+                  </a:txBody>
+                  <a:tcPr/>
+                </a:tc>
+                <a:tc>
+                  <a:txBody>
+                    <a:bodyPr/>
+                    <a:lstStyle/>
+                    <a:p>
+                      <a:endParaRPr lang="tr-TR" dirty="0"/>
+                    </a:p>
+                  </a:txBody>
+                  <a:tcPr/>
+                </a:tc>
+                <a:extLst>
+                  <a:ext uri="{0D108BD9-81ED-4DB2-BD59-A6C34878D82A}">
+                    <a16:rowId xmlns:a16="http://schemas.microsoft.com/office/drawing/2014/main" val="1885487499"/>
+                  </a:ext>
+                </a:extLst>
+              </a:tr>
+            </a:tbl>
+          </a:graphicData>
+        </a:graphic>
+      </p:graphicFrame>
+      <p:sp>
+        <p:nvSpPr>
+          <p:cNvPr id="8" name="TextBox 7">
+            <a:extLst>
+              <a:ext uri="{FF2B5EF4-FFF2-40B4-BE49-F238E27FC236}">
+                <a16:creationId xmlns:a16="http://schemas.microsoft.com/office/drawing/2014/main" id="{EF17E23C-015F-3E0B-6221-5DA04096F1B3}"/>
+              </a:ext>
+            </a:extLst>
+          </p:cNvPr>
+          <p:cNvSpPr txBox="1"/>
+          <p:nvPr/>
+        </p:nvSpPr>
+        <p:spPr>
+          <a:xfrm>
+            <a:off x="997586" y="4269342"/>
+            <a:ext cx="1129027" cy="369332"/>
+          </a:xfrm>
+          <a:prstGeom prst="rect">
+            <a:avLst/>
+          </a:prstGeom>
+          <a:noFill/>
+        </p:spPr>
+        <p:txBody>
+          <a:bodyPr wrap="none" rtlCol="0">
+            <a:spAutoFit/>
+          </a:bodyPr>
+          <a:lstStyle/>
+          <a:p>
+            <a:r>
+              <a:rPr lang="tr-TR" dirty="0"/>
+              <a:t>öğrenciler</a:t>
+            </a:r>
+          </a:p>
+        </p:txBody>
+      </p:sp>
+      <p:sp>
+        <p:nvSpPr>
+          <p:cNvPr id="9" name="TextBox 8">
+            <a:extLst>
+              <a:ext uri="{FF2B5EF4-FFF2-40B4-BE49-F238E27FC236}">
+                <a16:creationId xmlns:a16="http://schemas.microsoft.com/office/drawing/2014/main" id="{582E250B-0C4A-5435-E1B2-E9A285F65BFC}"/>
+              </a:ext>
+            </a:extLst>
+          </p:cNvPr>
+          <p:cNvSpPr txBox="1"/>
+          <p:nvPr/>
+        </p:nvSpPr>
+        <p:spPr>
+          <a:xfrm>
+            <a:off x="3984467" y="4269342"/>
+            <a:ext cx="1175065" cy="369332"/>
+          </a:xfrm>
+          <a:prstGeom prst="rect">
+            <a:avLst/>
+          </a:prstGeom>
+          <a:noFill/>
+        </p:spPr>
+        <p:txBody>
+          <a:bodyPr wrap="none" rtlCol="0">
+            <a:spAutoFit/>
+          </a:bodyPr>
+          <a:lstStyle/>
+          <a:p>
+            <a:r>
+              <a:rPr lang="tr-TR" dirty="0"/>
+              <a:t>başvurular</a:t>
+            </a:r>
+          </a:p>
+        </p:txBody>
+      </p:sp>
+      <p:sp>
+        <p:nvSpPr>
+          <p:cNvPr id="10" name="TextBox 9">
+            <a:extLst>
+              <a:ext uri="{FF2B5EF4-FFF2-40B4-BE49-F238E27FC236}">
+                <a16:creationId xmlns:a16="http://schemas.microsoft.com/office/drawing/2014/main" id="{4F17AB32-38DE-7001-563A-C344D5123D3B}"/>
+              </a:ext>
+            </a:extLst>
+          </p:cNvPr>
+          <p:cNvSpPr txBox="1"/>
+          <p:nvPr/>
+        </p:nvSpPr>
+        <p:spPr>
+          <a:xfrm>
+            <a:off x="6758424" y="4269342"/>
+            <a:ext cx="1355756" cy="369332"/>
+          </a:xfrm>
+          <a:prstGeom prst="rect">
+            <a:avLst/>
+          </a:prstGeom>
+          <a:noFill/>
+        </p:spPr>
+        <p:txBody>
+          <a:bodyPr wrap="none" rtlCol="0">
+            <a:spAutoFit/>
+          </a:bodyPr>
+          <a:lstStyle/>
+          <a:p>
+            <a:r>
+              <a:rPr lang="tr-TR" dirty="0"/>
+              <a:t>üniversiteler</a:t>
+            </a:r>
+          </a:p>
+        </p:txBody>
+      </p:sp>
+      <p:sp>
+        <p:nvSpPr>
+          <p:cNvPr id="11" name="TextBox 10">
+            <a:extLst>
+              <a:ext uri="{FF2B5EF4-FFF2-40B4-BE49-F238E27FC236}">
+                <a16:creationId xmlns:a16="http://schemas.microsoft.com/office/drawing/2014/main" id="{C40D7FBF-7E62-769B-B087-FCE7BC406C97}"/>
+              </a:ext>
+            </a:extLst>
+          </p:cNvPr>
+          <p:cNvSpPr txBox="1"/>
+          <p:nvPr/>
+        </p:nvSpPr>
+        <p:spPr>
+          <a:xfrm>
+            <a:off x="628650" y="1690689"/>
+            <a:ext cx="7979392" cy="2862322"/>
+          </a:xfrm>
+          <a:prstGeom prst="rect">
+            <a:avLst/>
+          </a:prstGeom>
+          <a:noFill/>
+        </p:spPr>
+        <p:txBody>
+          <a:bodyPr wrap="square" rtlCol="0">
+            <a:spAutoFit/>
+          </a:bodyPr>
+          <a:lstStyle/>
+          <a:p>
+            <a:r>
+              <a:rPr lang="tr-TR" sz="2800" i="1" dirty="0" err="1"/>
+              <a:t>R.A</a:t>
+            </a:r>
+            <a:r>
+              <a:rPr lang="tr-TR" sz="2800" dirty="0" err="1"/>
+              <a:t>'dan</a:t>
+            </a:r>
+            <a:r>
+              <a:rPr lang="tr-TR" sz="2800" dirty="0"/>
+              <a:t> </a:t>
+            </a:r>
+            <a:r>
+              <a:rPr lang="tr-TR" sz="2800" i="1" dirty="0" err="1"/>
+              <a:t>S.B</a:t>
+            </a:r>
+            <a:r>
+              <a:rPr lang="tr-TR" sz="2800" dirty="0" err="1"/>
+              <a:t>'ye</a:t>
+            </a:r>
+            <a:r>
+              <a:rPr lang="tr-TR" sz="2800" dirty="0"/>
+              <a:t> referans bütünlüğü sağlamak istiyoruz.</a:t>
+            </a:r>
+          </a:p>
+          <a:p>
+            <a:endParaRPr lang="tr-TR" sz="2800" dirty="0"/>
+          </a:p>
+          <a:p>
+            <a:pPr marL="457200" indent="-457200">
+              <a:buFont typeface="Arial" panose="020B0604020202020204" pitchFamily="34" charset="0"/>
+              <a:buChar char="•"/>
+            </a:pPr>
+            <a:r>
+              <a:rPr lang="tr-TR" sz="2800" dirty="0" err="1"/>
+              <a:t>delete</a:t>
+            </a:r>
+            <a:r>
+              <a:rPr lang="tr-TR" sz="2800" dirty="0"/>
+              <a:t> </a:t>
+            </a:r>
+            <a:r>
+              <a:rPr lang="tr-TR" sz="2800" dirty="0" err="1"/>
+              <a:t>from</a:t>
+            </a:r>
+            <a:r>
+              <a:rPr lang="tr-TR" sz="2800" dirty="0"/>
+              <a:t> S: </a:t>
+            </a:r>
+          </a:p>
+          <a:p>
+            <a:pPr marL="914400" lvl="1" indent="-457200">
+              <a:buFont typeface="Arial" panose="020B0604020202020204" pitchFamily="34" charset="0"/>
+              <a:buChar char="•"/>
+            </a:pPr>
+            <a:r>
+              <a:rPr lang="tr-TR" sz="2000" dirty="0" err="1">
+                <a:latin typeface="Fira Code" panose="020B0809050000020004" pitchFamily="49" charset="0"/>
+                <a:ea typeface="Fira Code" panose="020B0809050000020004" pitchFamily="49" charset="0"/>
+              </a:rPr>
+              <a:t>restrict</a:t>
+            </a:r>
+            <a:r>
+              <a:rPr lang="tr-TR" sz="2000" dirty="0">
+                <a:latin typeface="Fira Code" panose="020B0809050000020004" pitchFamily="49" charset="0"/>
+                <a:ea typeface="Fira Code" panose="020B0809050000020004" pitchFamily="49" charset="0"/>
+              </a:rPr>
+              <a:t>, set </a:t>
+            </a:r>
+            <a:r>
+              <a:rPr lang="tr-TR" sz="2000" dirty="0" err="1">
+                <a:latin typeface="Fira Code" panose="020B0809050000020004" pitchFamily="49" charset="0"/>
+                <a:ea typeface="Fira Code" panose="020B0809050000020004" pitchFamily="49" charset="0"/>
+              </a:rPr>
+              <a:t>null</a:t>
+            </a:r>
+            <a:r>
+              <a:rPr lang="tr-TR" sz="2000" dirty="0">
+                <a:latin typeface="Fira Code" panose="020B0809050000020004" pitchFamily="49" charset="0"/>
+                <a:ea typeface="Fira Code" panose="020B0809050000020004" pitchFamily="49" charset="0"/>
+              </a:rPr>
+              <a:t>, </a:t>
+            </a:r>
+            <a:r>
+              <a:rPr lang="tr-TR" sz="2000" dirty="0" err="1">
+                <a:latin typeface="Fira Code" panose="020B0809050000020004" pitchFamily="49" charset="0"/>
+                <a:ea typeface="Fira Code" panose="020B0809050000020004" pitchFamily="49" charset="0"/>
+              </a:rPr>
+              <a:t>cascade</a:t>
+            </a:r>
+            <a:endParaRPr lang="tr-TR" sz="2000" dirty="0">
+              <a:latin typeface="Fira Code" panose="020B0809050000020004" pitchFamily="49" charset="0"/>
+              <a:ea typeface="Fira Code" panose="020B0809050000020004" pitchFamily="49" charset="0"/>
+            </a:endParaRPr>
+          </a:p>
+          <a:p>
+            <a:pPr marL="457200" indent="-457200">
+              <a:buFont typeface="Arial" panose="020B0604020202020204" pitchFamily="34" charset="0"/>
+              <a:buChar char="•"/>
+            </a:pPr>
+            <a:r>
+              <a:rPr lang="tr-TR" sz="2800" dirty="0" err="1"/>
+              <a:t>update</a:t>
+            </a:r>
+            <a:r>
+              <a:rPr lang="tr-TR" sz="2800" dirty="0"/>
+              <a:t> S.B: </a:t>
+            </a:r>
+          </a:p>
+          <a:p>
+            <a:pPr marL="914400" lvl="1" indent="-457200">
+              <a:buFont typeface="Arial" panose="020B0604020202020204" pitchFamily="34" charset="0"/>
+              <a:buChar char="•"/>
+            </a:pPr>
+            <a:r>
+              <a:rPr lang="tr-TR" sz="2000" dirty="0" err="1">
+                <a:latin typeface="Fira Code" panose="020B0809050000020004" pitchFamily="49" charset="0"/>
+                <a:ea typeface="Fira Code" panose="020B0809050000020004" pitchFamily="49" charset="0"/>
+              </a:rPr>
+              <a:t>restrict</a:t>
+            </a:r>
+            <a:r>
+              <a:rPr lang="tr-TR" sz="2000" dirty="0">
+                <a:latin typeface="Fira Code" panose="020B0809050000020004" pitchFamily="49" charset="0"/>
+                <a:ea typeface="Fira Code" panose="020B0809050000020004" pitchFamily="49" charset="0"/>
+              </a:rPr>
+              <a:t>, set </a:t>
+            </a:r>
+            <a:r>
+              <a:rPr lang="tr-TR" sz="2000" dirty="0" err="1">
+                <a:latin typeface="Fira Code" panose="020B0809050000020004" pitchFamily="49" charset="0"/>
+                <a:ea typeface="Fira Code" panose="020B0809050000020004" pitchFamily="49" charset="0"/>
+              </a:rPr>
+              <a:t>null</a:t>
+            </a:r>
+            <a:r>
+              <a:rPr lang="tr-TR" sz="2000" dirty="0">
+                <a:latin typeface="Fira Code" panose="020B0809050000020004" pitchFamily="49" charset="0"/>
+                <a:ea typeface="Fira Code" panose="020B0809050000020004" pitchFamily="49" charset="0"/>
+              </a:rPr>
+              <a:t>, </a:t>
+            </a:r>
+            <a:r>
+              <a:rPr lang="tr-TR" sz="2000" dirty="0" err="1">
+                <a:latin typeface="Fira Code" panose="020B0809050000020004" pitchFamily="49" charset="0"/>
+                <a:ea typeface="Fira Code" panose="020B0809050000020004" pitchFamily="49" charset="0"/>
+              </a:rPr>
+              <a:t>cascade</a:t>
+            </a:r>
+            <a:endParaRPr lang="tr-TR" sz="2000" dirty="0">
+              <a:latin typeface="Fira Code" panose="020B0809050000020004" pitchFamily="49" charset="0"/>
+              <a:ea typeface="Fira Code" panose="020B0809050000020004" pitchFamily="49" charset="0"/>
+            </a:endParaRPr>
+          </a:p>
+          <a:p>
+            <a:pPr marL="457200" indent="-457200">
+              <a:buFont typeface="Arial" panose="020B0604020202020204" pitchFamily="34" charset="0"/>
+              <a:buChar char="•"/>
+            </a:pPr>
+            <a:endParaRPr lang="tr-TR" sz="2800" dirty="0"/>
+          </a:p>
+        </p:txBody>
+      </p:sp>
+    </p:spTree>
+    <p:extLst>
+      <p:ext uri="{BB962C8B-B14F-4D97-AF65-F5344CB8AC3E}">
+        <p14:creationId xmlns:p14="http://schemas.microsoft.com/office/powerpoint/2010/main" val="3360632432"/>
       </p:ext>
     </p:extLst>
   </p:cSld>

</xml_diff>